<commit_message>
Modifico simulaciones del comparador y arreglo esquemático
</commit_message>
<xml_diff>
--- a/Documentos/Presentaciones/Presentación del Proyecto.pptx
+++ b/Documentos/Presentaciones/Presentación del Proyecto.pptx
@@ -224,7 +224,7 @@
           <a:p>
             <a:fld id="{51BCAC93-7060-47A6-8C73-BF49BF292F85}" type="datetimeFigureOut">
               <a:rPr lang="es-ES" smtClean="0"/>
-              <a:t>26/03/2025</a:t>
+              <a:t>29/03/2025</a:t>
             </a:fld>
             <a:endParaRPr lang="es-ES"/>
           </a:p>
@@ -402,7 +402,7 @@
           <a:p>
             <a:fld id="{A45B1386-48DD-4315-9E6B-F140ABA5AC5B}" type="datetimeFigureOut">
               <a:rPr lang="es-ES" smtClean="0"/>
-              <a:t>26/03/2025</a:t>
+              <a:t>29/03/2025</a:t>
             </a:fld>
             <a:endParaRPr lang="es-ES"/>
           </a:p>
@@ -817,7 +817,7 @@
           <a:p>
             <a:fld id="{0725E806-DC5C-4B34-B899-89303BC37E43}" type="datetimeFigureOut">
               <a:rPr lang="es-ES" smtClean="0"/>
-              <a:t>26/03/2025</a:t>
+              <a:t>29/03/2025</a:t>
             </a:fld>
             <a:endParaRPr lang="es-ES"/>
           </a:p>
@@ -1015,7 +1015,7 @@
           <a:p>
             <a:fld id="{0725E806-DC5C-4B34-B899-89303BC37E43}" type="datetimeFigureOut">
               <a:rPr lang="es-ES" smtClean="0"/>
-              <a:t>26/03/2025</a:t>
+              <a:t>29/03/2025</a:t>
             </a:fld>
             <a:endParaRPr lang="es-ES"/>
           </a:p>
@@ -1223,7 +1223,7 @@
           <a:p>
             <a:fld id="{0725E806-DC5C-4B34-B899-89303BC37E43}" type="datetimeFigureOut">
               <a:rPr lang="es-ES" smtClean="0"/>
-              <a:t>26/03/2025</a:t>
+              <a:t>29/03/2025</a:t>
             </a:fld>
             <a:endParaRPr lang="es-ES"/>
           </a:p>
@@ -1421,7 +1421,7 @@
           <a:p>
             <a:fld id="{0725E806-DC5C-4B34-B899-89303BC37E43}" type="datetimeFigureOut">
               <a:rPr lang="es-ES" smtClean="0"/>
-              <a:t>26/03/2025</a:t>
+              <a:t>29/03/2025</a:t>
             </a:fld>
             <a:endParaRPr lang="es-ES"/>
           </a:p>
@@ -1696,7 +1696,7 @@
           <a:p>
             <a:fld id="{0725E806-DC5C-4B34-B899-89303BC37E43}" type="datetimeFigureOut">
               <a:rPr lang="es-ES" smtClean="0"/>
-              <a:t>26/03/2025</a:t>
+              <a:t>29/03/2025</a:t>
             </a:fld>
             <a:endParaRPr lang="es-ES"/>
           </a:p>
@@ -1961,7 +1961,7 @@
           <a:p>
             <a:fld id="{0725E806-DC5C-4B34-B899-89303BC37E43}" type="datetimeFigureOut">
               <a:rPr lang="es-ES" smtClean="0"/>
-              <a:t>26/03/2025</a:t>
+              <a:t>29/03/2025</a:t>
             </a:fld>
             <a:endParaRPr lang="es-ES"/>
           </a:p>
@@ -2373,7 +2373,7 @@
           <a:p>
             <a:fld id="{0725E806-DC5C-4B34-B899-89303BC37E43}" type="datetimeFigureOut">
               <a:rPr lang="es-ES" smtClean="0"/>
-              <a:t>26/03/2025</a:t>
+              <a:t>29/03/2025</a:t>
             </a:fld>
             <a:endParaRPr lang="es-ES"/>
           </a:p>
@@ -2514,7 +2514,7 @@
           <a:p>
             <a:fld id="{0725E806-DC5C-4B34-B899-89303BC37E43}" type="datetimeFigureOut">
               <a:rPr lang="es-ES" smtClean="0"/>
-              <a:t>26/03/2025</a:t>
+              <a:t>29/03/2025</a:t>
             </a:fld>
             <a:endParaRPr lang="es-ES"/>
           </a:p>
@@ -2627,7 +2627,7 @@
           <a:p>
             <a:fld id="{0725E806-DC5C-4B34-B899-89303BC37E43}" type="datetimeFigureOut">
               <a:rPr lang="es-ES" smtClean="0"/>
-              <a:t>26/03/2025</a:t>
+              <a:t>29/03/2025</a:t>
             </a:fld>
             <a:endParaRPr lang="es-ES"/>
           </a:p>
@@ -2938,7 +2938,7 @@
           <a:p>
             <a:fld id="{0725E806-DC5C-4B34-B899-89303BC37E43}" type="datetimeFigureOut">
               <a:rPr lang="es-ES" smtClean="0"/>
-              <a:t>26/03/2025</a:t>
+              <a:t>29/03/2025</a:t>
             </a:fld>
             <a:endParaRPr lang="es-ES"/>
           </a:p>
@@ -3226,7 +3226,7 @@
           <a:p>
             <a:fld id="{0725E806-DC5C-4B34-B899-89303BC37E43}" type="datetimeFigureOut">
               <a:rPr lang="es-ES" smtClean="0"/>
-              <a:t>26/03/2025</a:t>
+              <a:t>29/03/2025</a:t>
             </a:fld>
             <a:endParaRPr lang="es-ES"/>
           </a:p>
@@ -3467,7 +3467,7 @@
           <a:p>
             <a:fld id="{0725E806-DC5C-4B34-B899-89303BC37E43}" type="datetimeFigureOut">
               <a:rPr lang="es-ES" smtClean="0"/>
-              <a:t>26/03/2025</a:t>
+              <a:t>29/03/2025</a:t>
             </a:fld>
             <a:endParaRPr lang="es-ES"/>
           </a:p>
@@ -4248,66 +4248,6 @@
           <a:chExt cx="0" cy="0"/>
         </a:xfrm>
       </p:grpSpPr>
-      <p:pic>
-        <p:nvPicPr>
-          <p:cNvPr id="7" name="Imagen 6">
-            <a:extLst>
-              <a:ext uri="{FF2B5EF4-FFF2-40B4-BE49-F238E27FC236}">
-                <a16:creationId xmlns:a16="http://schemas.microsoft.com/office/drawing/2014/main" id="{265A34FD-E8BD-81B6-AD13-63ACC041D914}"/>
-              </a:ext>
-            </a:extLst>
-          </p:cNvPr>
-          <p:cNvPicPr>
-            <a:picLocks noChangeAspect="1"/>
-          </p:cNvPicPr>
-          <p:nvPr/>
-        </p:nvPicPr>
-        <p:blipFill>
-          <a:blip r:embed="rId2"/>
-          <a:stretch>
-            <a:fillRect/>
-          </a:stretch>
-        </p:blipFill>
-        <p:spPr>
-          <a:xfrm>
-            <a:off x="3714414" y="419100"/>
-            <a:ext cx="8211222" cy="3373918"/>
-          </a:xfrm>
-          <a:prstGeom prst="rect">
-            <a:avLst/>
-          </a:prstGeom>
-        </p:spPr>
-      </p:pic>
-      <p:pic>
-        <p:nvPicPr>
-          <p:cNvPr id="9" name="Imagen 8">
-            <a:extLst>
-              <a:ext uri="{FF2B5EF4-FFF2-40B4-BE49-F238E27FC236}">
-                <a16:creationId xmlns:a16="http://schemas.microsoft.com/office/drawing/2014/main" id="{68CAA5CB-8653-ABEF-3E33-70AF65AA34B6}"/>
-              </a:ext>
-            </a:extLst>
-          </p:cNvPr>
-          <p:cNvPicPr>
-            <a:picLocks noChangeAspect="1"/>
-          </p:cNvPicPr>
-          <p:nvPr/>
-        </p:nvPicPr>
-        <p:blipFill>
-          <a:blip r:embed="rId3"/>
-          <a:stretch>
-            <a:fillRect/>
-          </a:stretch>
-        </p:blipFill>
-        <p:spPr>
-          <a:xfrm>
-            <a:off x="3938080" y="4024151"/>
-            <a:ext cx="7268589" cy="2314898"/>
-          </a:xfrm>
-          <a:prstGeom prst="rect">
-            <a:avLst/>
-          </a:prstGeom>
-        </p:spPr>
-      </p:pic>
       <p:sp>
         <p:nvSpPr>
           <p:cNvPr id="10" name="CuadroTexto 9">
@@ -4378,6 +4318,66 @@
           </a:p>
         </p:txBody>
       </p:sp>
+      <p:pic>
+        <p:nvPicPr>
+          <p:cNvPr id="13" name="Imagen 12">
+            <a:extLst>
+              <a:ext uri="{FF2B5EF4-FFF2-40B4-BE49-F238E27FC236}">
+                <a16:creationId xmlns:a16="http://schemas.microsoft.com/office/drawing/2014/main" id="{0FC9518B-2C7D-DF9B-D7CB-6225A61D39A7}"/>
+              </a:ext>
+            </a:extLst>
+          </p:cNvPr>
+          <p:cNvPicPr>
+            <a:picLocks noChangeAspect="1"/>
+          </p:cNvPicPr>
+          <p:nvPr/>
+        </p:nvPicPr>
+        <p:blipFill>
+          <a:blip r:embed="rId2"/>
+          <a:stretch>
+            <a:fillRect/>
+          </a:stretch>
+        </p:blipFill>
+        <p:spPr>
+          <a:xfrm>
+            <a:off x="3956476" y="677482"/>
+            <a:ext cx="8012004" cy="3007485"/>
+          </a:xfrm>
+          <a:prstGeom prst="rect">
+            <a:avLst/>
+          </a:prstGeom>
+        </p:spPr>
+      </p:pic>
+      <p:pic>
+        <p:nvPicPr>
+          <p:cNvPr id="15" name="Imagen 14">
+            <a:extLst>
+              <a:ext uri="{FF2B5EF4-FFF2-40B4-BE49-F238E27FC236}">
+                <a16:creationId xmlns:a16="http://schemas.microsoft.com/office/drawing/2014/main" id="{2953C5C9-2FD1-288A-8FFF-9071DC980892}"/>
+              </a:ext>
+            </a:extLst>
+          </p:cNvPr>
+          <p:cNvPicPr>
+            <a:picLocks noChangeAspect="1"/>
+          </p:cNvPicPr>
+          <p:nvPr/>
+        </p:nvPicPr>
+        <p:blipFill>
+          <a:blip r:embed="rId3"/>
+          <a:stretch>
+            <a:fillRect/>
+          </a:stretch>
+        </p:blipFill>
+        <p:spPr>
+          <a:xfrm>
+            <a:off x="4611322" y="3919265"/>
+            <a:ext cx="6237653" cy="2491695"/>
+          </a:xfrm>
+          <a:prstGeom prst="rect">
+            <a:avLst/>
+          </a:prstGeom>
+        </p:spPr>
+      </p:pic>
     </p:spTree>
     <p:extLst>
       <p:ext uri="{BB962C8B-B14F-4D97-AF65-F5344CB8AC3E}">
@@ -4631,7 +4631,7 @@
         </p:spPr>
         <p:txBody>
           <a:bodyPr>
-            <a:normAutofit/>
+            <a:normAutofit fontScale="92500" lnSpcReduction="10000"/>
           </a:bodyPr>
           <a:lstStyle/>
           <a:p>
@@ -4679,13 +4679,13 @@
           <a:p>
             <a:r>
               <a:rPr lang="es-ES" sz="1600" dirty="0"/>
-              <a:t>Sensor YL-83: </a:t>
+              <a:t>Sensor HIH6130:  </a:t>
             </a:r>
             <a:r>
               <a:rPr lang="es-ES" sz="1600" dirty="0">
                 <a:hlinkClick r:id="rId4"/>
               </a:rPr>
-              <a:t>https://tienda.bricogeek.com/otros-sensores/1741-modulo-sensor-de-lluvia-y-gotas-de-agua-yl-83.html</a:t>
+              <a:t>https://prod-edam.honeywell.com/content/dam/honeywell-edam/sps/siot/en-ca/products/sensors/humidity-with-temperature-sensors/honeywell-humidicon-hih6100-series/documents/sps-siot-hih6130-6131-install-50061154-3-en-ciid-142166.pdf</a:t>
             </a:r>
             <a:endParaRPr lang="es-ES" sz="1600" dirty="0"/>
           </a:p>
@@ -4698,8 +4698,9 @@
               <a:rPr lang="es-ES" sz="1600" dirty="0">
                 <a:hlinkClick r:id="rId5"/>
               </a:rPr>
-              <a:t>https://www.ti.com/lit/ds/symlink/lm1117.pdf</a:t>
+              <a:t>https://www.ti.com/lit/ds/symlink/lm1117.pdf?ts=1743271923242&amp;ref_url=https%253A%252F%252Fwww.ti.com%252Fproduct%252Fes-mx%252FLM1117</a:t>
             </a:r>
+            <a:endParaRPr lang="es-ES" sz="1600" dirty="0"/>
           </a:p>
           <a:p>
             <a:r>

</xml_diff>

<commit_message>
Cambio de presentacion(esquematico,consumo,layout), minimas correciones en el esquematico
</commit_message>
<xml_diff>
--- a/Documentos/Presentaciones/Presentación del Proyecto.pptx
+++ b/Documentos/Presentaciones/Presentación del Proyecto.pptx
@@ -2,28 +2,32 @@
 <file path=ppt/presentation.xml><?xml version="1.0" encoding="utf-8"?>
 <p:presentation xmlns:a="http://schemas.openxmlformats.org/drawingml/2006/main" xmlns:r="http://schemas.openxmlformats.org/officeDocument/2006/relationships" xmlns:p="http://schemas.openxmlformats.org/presentationml/2006/main" saveSubsetFonts="1">
   <p:sldMasterIdLst>
-    <p:sldMasterId id="2147483648" r:id="rId1"/>
+    <p:sldMasterId id="2147483648" r:id="rId4"/>
   </p:sldMasterIdLst>
   <p:notesMasterIdLst>
-    <p:notesMasterId r:id="rId15"/>
+    <p:notesMasterId r:id="rId22"/>
   </p:notesMasterIdLst>
   <p:handoutMasterIdLst>
-    <p:handoutMasterId r:id="rId16"/>
+    <p:handoutMasterId r:id="rId23"/>
   </p:handoutMasterIdLst>
   <p:sldIdLst>
-    <p:sldId id="256" r:id="rId2"/>
-    <p:sldId id="257" r:id="rId3"/>
-    <p:sldId id="258" r:id="rId4"/>
-    <p:sldId id="259" r:id="rId5"/>
-    <p:sldId id="264" r:id="rId6"/>
-    <p:sldId id="266" r:id="rId7"/>
-    <p:sldId id="260" r:id="rId8"/>
-    <p:sldId id="261" r:id="rId9"/>
-    <p:sldId id="267" r:id="rId10"/>
-    <p:sldId id="268" r:id="rId11"/>
-    <p:sldId id="270" r:id="rId12"/>
-    <p:sldId id="271" r:id="rId13"/>
-    <p:sldId id="262" r:id="rId14"/>
+    <p:sldId id="256" r:id="rId5"/>
+    <p:sldId id="257" r:id="rId6"/>
+    <p:sldId id="258" r:id="rId7"/>
+    <p:sldId id="259" r:id="rId8"/>
+    <p:sldId id="264" r:id="rId9"/>
+    <p:sldId id="266" r:id="rId10"/>
+    <p:sldId id="260" r:id="rId11"/>
+    <p:sldId id="261" r:id="rId12"/>
+    <p:sldId id="267" r:id="rId13"/>
+    <p:sldId id="268" r:id="rId14"/>
+    <p:sldId id="272" r:id="rId15"/>
+    <p:sldId id="273" r:id="rId16"/>
+    <p:sldId id="274" r:id="rId17"/>
+    <p:sldId id="275" r:id="rId18"/>
+    <p:sldId id="270" r:id="rId19"/>
+    <p:sldId id="271" r:id="rId20"/>
+    <p:sldId id="262" r:id="rId21"/>
   </p:sldIdLst>
   <p:sldSz cx="12192000" cy="6858000"/>
   <p:notesSz cx="6858000" cy="9144000"/>
@@ -224,7 +228,7 @@
           <a:p>
             <a:fld id="{51BCAC93-7060-47A6-8C73-BF49BF292F85}" type="datetimeFigureOut">
               <a:rPr lang="es-ES" smtClean="0"/>
-              <a:t>29/03/2025</a:t>
+              <a:t>01/04/2025</a:t>
             </a:fld>
             <a:endParaRPr lang="es-ES"/>
           </a:p>
@@ -402,7 +406,7 @@
           <a:p>
             <a:fld id="{A45B1386-48DD-4315-9E6B-F140ABA5AC5B}" type="datetimeFigureOut">
               <a:rPr lang="es-ES" smtClean="0"/>
-              <a:t>29/03/2025</a:t>
+              <a:t>01/04/2025</a:t>
             </a:fld>
             <a:endParaRPr lang="es-ES"/>
           </a:p>
@@ -670,6 +674,90 @@
 </p:notesMaster>
 </file>
 
+<file path=ppt/notesSlides/notesSlide1.xml><?xml version="1.0" encoding="utf-8"?>
+<p:notes xmlns:a="http://schemas.openxmlformats.org/drawingml/2006/main" xmlns:r="http://schemas.openxmlformats.org/officeDocument/2006/relationships" xmlns:p="http://schemas.openxmlformats.org/presentationml/2006/main">
+  <p:cSld>
+    <p:spTree>
+      <p:nvGrpSpPr>
+        <p:cNvPr id="1" name=""/>
+        <p:cNvGrpSpPr/>
+        <p:nvPr/>
+      </p:nvGrpSpPr>
+      <p:grpSpPr>
+        <a:xfrm>
+          <a:off x="0" y="0"/>
+          <a:ext cx="0" cy="0"/>
+          <a:chOff x="0" y="0"/>
+          <a:chExt cx="0" cy="0"/>
+        </a:xfrm>
+      </p:grpSpPr>
+      <p:sp>
+        <p:nvSpPr>
+          <p:cNvPr id="2" name="Marcador de imagen de diapositiva 1"/>
+          <p:cNvSpPr>
+            <a:spLocks noGrp="1" noRot="1" noChangeAspect="1"/>
+          </p:cNvSpPr>
+          <p:nvPr>
+            <p:ph type="sldImg"/>
+          </p:nvPr>
+        </p:nvSpPr>
+        <p:spPr/>
+      </p:sp>
+      <p:sp>
+        <p:nvSpPr>
+          <p:cNvPr id="3" name="Marcador de notas 2"/>
+          <p:cNvSpPr>
+            <a:spLocks noGrp="1"/>
+          </p:cNvSpPr>
+          <p:nvPr>
+            <p:ph type="body" idx="1"/>
+          </p:nvPr>
+        </p:nvSpPr>
+        <p:spPr/>
+        <p:txBody>
+          <a:bodyPr/>
+          <a:lstStyle/>
+          <a:p>
+            <a:endParaRPr lang="es-ES" dirty="0"/>
+          </a:p>
+        </p:txBody>
+      </p:sp>
+      <p:sp>
+        <p:nvSpPr>
+          <p:cNvPr id="4" name="Marcador de número de diapositiva 3"/>
+          <p:cNvSpPr>
+            <a:spLocks noGrp="1"/>
+          </p:cNvSpPr>
+          <p:nvPr>
+            <p:ph type="sldNum" sz="quarter" idx="5"/>
+          </p:nvPr>
+        </p:nvSpPr>
+        <p:spPr/>
+        <p:txBody>
+          <a:bodyPr/>
+          <a:lstStyle/>
+          <a:p>
+            <a:fld id="{C0D5B384-C0A1-405E-ACC1-3CD347649FCC}" type="slidenum">
+              <a:rPr lang="es-ES" smtClean="0"/>
+              <a:t>4</a:t>
+            </a:fld>
+            <a:endParaRPr lang="es-ES"/>
+          </a:p>
+        </p:txBody>
+      </p:sp>
+    </p:spTree>
+    <p:extLst>
+      <p:ext uri="{BB962C8B-B14F-4D97-AF65-F5344CB8AC3E}">
+        <p14:creationId xmlns:p14="http://schemas.microsoft.com/office/powerpoint/2010/main" val="1746297802"/>
+      </p:ext>
+    </p:extLst>
+  </p:cSld>
+  <p:clrMapOvr>
+    <a:masterClrMapping/>
+  </p:clrMapOvr>
+</p:notes>
+</file>
+
 <file path=ppt/slideLayouts/slideLayout1.xml><?xml version="1.0" encoding="utf-8"?>
 <p:sldLayout xmlns:a="http://schemas.openxmlformats.org/drawingml/2006/main" xmlns:r="http://schemas.openxmlformats.org/officeDocument/2006/relationships" xmlns:p="http://schemas.openxmlformats.org/presentationml/2006/main" type="title" preserve="1">
   <p:cSld name="Diapositiva de título">
@@ -815,9 +903,9 @@
           <a:bodyPr/>
           <a:lstStyle/>
           <a:p>
-            <a:fld id="{0725E806-DC5C-4B34-B899-89303BC37E43}" type="datetimeFigureOut">
+            <a:fld id="{C132170E-547A-4460-A15D-1C10C4C1E4F4}" type="datetime1">
               <a:rPr lang="es-ES" smtClean="0"/>
-              <a:t>29/03/2025</a:t>
+              <a:t>01/04/2025</a:t>
             </a:fld>
             <a:endParaRPr lang="es-ES"/>
           </a:p>
@@ -1013,9 +1101,9 @@
           <a:bodyPr/>
           <a:lstStyle/>
           <a:p>
-            <a:fld id="{0725E806-DC5C-4B34-B899-89303BC37E43}" type="datetimeFigureOut">
+            <a:fld id="{3FF4DC2C-78D1-4FFB-BAF2-BA41252B3A8D}" type="datetime1">
               <a:rPr lang="es-ES" smtClean="0"/>
-              <a:t>29/03/2025</a:t>
+              <a:t>01/04/2025</a:t>
             </a:fld>
             <a:endParaRPr lang="es-ES"/>
           </a:p>
@@ -1221,9 +1309,9 @@
           <a:bodyPr/>
           <a:lstStyle/>
           <a:p>
-            <a:fld id="{0725E806-DC5C-4B34-B899-89303BC37E43}" type="datetimeFigureOut">
+            <a:fld id="{85C31C29-86E7-4B63-B456-A6ABB6459D54}" type="datetime1">
               <a:rPr lang="es-ES" smtClean="0"/>
-              <a:t>29/03/2025</a:t>
+              <a:t>01/04/2025</a:t>
             </a:fld>
             <a:endParaRPr lang="es-ES"/>
           </a:p>
@@ -1419,9 +1507,9 @@
           <a:bodyPr/>
           <a:lstStyle/>
           <a:p>
-            <a:fld id="{0725E806-DC5C-4B34-B899-89303BC37E43}" type="datetimeFigureOut">
+            <a:fld id="{AF7948F7-4188-4DDE-8E10-7E648C8F6285}" type="datetime1">
               <a:rPr lang="es-ES" smtClean="0"/>
-              <a:t>29/03/2025</a:t>
+              <a:t>01/04/2025</a:t>
             </a:fld>
             <a:endParaRPr lang="es-ES"/>
           </a:p>
@@ -1694,9 +1782,9 @@
           <a:bodyPr/>
           <a:lstStyle/>
           <a:p>
-            <a:fld id="{0725E806-DC5C-4B34-B899-89303BC37E43}" type="datetimeFigureOut">
+            <a:fld id="{45B4E5D2-FB7D-47AE-BB7B-CCEDFAA937DE}" type="datetime1">
               <a:rPr lang="es-ES" smtClean="0"/>
-              <a:t>29/03/2025</a:t>
+              <a:t>01/04/2025</a:t>
             </a:fld>
             <a:endParaRPr lang="es-ES"/>
           </a:p>
@@ -1959,9 +2047,9 @@
           <a:bodyPr/>
           <a:lstStyle/>
           <a:p>
-            <a:fld id="{0725E806-DC5C-4B34-B899-89303BC37E43}" type="datetimeFigureOut">
+            <a:fld id="{5169BBBF-8397-42D0-97DC-B50A5308270B}" type="datetime1">
               <a:rPr lang="es-ES" smtClean="0"/>
-              <a:t>29/03/2025</a:t>
+              <a:t>01/04/2025</a:t>
             </a:fld>
             <a:endParaRPr lang="es-ES"/>
           </a:p>
@@ -2371,9 +2459,9 @@
           <a:bodyPr/>
           <a:lstStyle/>
           <a:p>
-            <a:fld id="{0725E806-DC5C-4B34-B899-89303BC37E43}" type="datetimeFigureOut">
+            <a:fld id="{AFEC1565-3E0D-4A5B-9F95-C715B0079CD4}" type="datetime1">
               <a:rPr lang="es-ES" smtClean="0"/>
-              <a:t>29/03/2025</a:t>
+              <a:t>01/04/2025</a:t>
             </a:fld>
             <a:endParaRPr lang="es-ES"/>
           </a:p>
@@ -2512,9 +2600,9 @@
           <a:bodyPr/>
           <a:lstStyle/>
           <a:p>
-            <a:fld id="{0725E806-DC5C-4B34-B899-89303BC37E43}" type="datetimeFigureOut">
+            <a:fld id="{74818B9A-9328-400F-B79F-4F2E059ECD27}" type="datetime1">
               <a:rPr lang="es-ES" smtClean="0"/>
-              <a:t>29/03/2025</a:t>
+              <a:t>01/04/2025</a:t>
             </a:fld>
             <a:endParaRPr lang="es-ES"/>
           </a:p>
@@ -2625,9 +2713,9 @@
           <a:bodyPr/>
           <a:lstStyle/>
           <a:p>
-            <a:fld id="{0725E806-DC5C-4B34-B899-89303BC37E43}" type="datetimeFigureOut">
+            <a:fld id="{4C73E90F-D9A2-4770-AC5B-B1E3E5445AB8}" type="datetime1">
               <a:rPr lang="es-ES" smtClean="0"/>
-              <a:t>29/03/2025</a:t>
+              <a:t>01/04/2025</a:t>
             </a:fld>
             <a:endParaRPr lang="es-ES"/>
           </a:p>
@@ -2936,9 +3024,9 @@
           <a:bodyPr/>
           <a:lstStyle/>
           <a:p>
-            <a:fld id="{0725E806-DC5C-4B34-B899-89303BC37E43}" type="datetimeFigureOut">
+            <a:fld id="{260AFA94-EF25-440C-B337-00E9F968541E}" type="datetime1">
               <a:rPr lang="es-ES" smtClean="0"/>
-              <a:t>29/03/2025</a:t>
+              <a:t>01/04/2025</a:t>
             </a:fld>
             <a:endParaRPr lang="es-ES"/>
           </a:p>
@@ -3224,9 +3312,9 @@
           <a:bodyPr/>
           <a:lstStyle/>
           <a:p>
-            <a:fld id="{0725E806-DC5C-4B34-B899-89303BC37E43}" type="datetimeFigureOut">
+            <a:fld id="{807B0780-8930-402B-9FF0-242D5A192479}" type="datetime1">
               <a:rPr lang="es-ES" smtClean="0"/>
-              <a:t>29/03/2025</a:t>
+              <a:t>01/04/2025</a:t>
             </a:fld>
             <a:endParaRPr lang="es-ES"/>
           </a:p>
@@ -3465,9 +3553,9 @@
             </a:lvl1pPr>
           </a:lstStyle>
           <a:p>
-            <a:fld id="{0725E806-DC5C-4B34-B899-89303BC37E43}" type="datetimeFigureOut">
+            <a:fld id="{B0AE733E-5559-4DFC-8A80-6FF4354DA9AB}" type="datetime1">
               <a:rPr lang="es-ES" smtClean="0"/>
-              <a:t>29/03/2025</a:t>
+              <a:t>01/04/2025</a:t>
             </a:fld>
             <a:endParaRPr lang="es-ES"/>
           </a:p>
@@ -3584,6 +3672,7 @@
     <p:sldLayoutId id="2147483658" r:id="rId10"/>
     <p:sldLayoutId id="2147483659" r:id="rId11"/>
   </p:sldLayoutIdLst>
+  <p:hf hdr="0" ftr="0" dt="0"/>
   <p:txStyles>
     <p:titleStyle>
       <a:lvl1pPr algn="l" defTabSz="914400" rtl="0" eaLnBrk="1" latinLnBrk="0" hangingPunct="1">
@@ -4087,6 +4176,35 @@
           </a:p>
         </p:txBody>
       </p:sp>
+      <p:sp>
+        <p:nvSpPr>
+          <p:cNvPr id="5" name="Marcador de número de diapositiva 4">
+            <a:extLst>
+              <a:ext uri="{FF2B5EF4-FFF2-40B4-BE49-F238E27FC236}">
+                <a16:creationId xmlns:a16="http://schemas.microsoft.com/office/drawing/2014/main" id="{1CC3CBCA-0154-4234-564B-6C4DEC86F27C}"/>
+              </a:ext>
+            </a:extLst>
+          </p:cNvPr>
+          <p:cNvSpPr>
+            <a:spLocks noGrp="1"/>
+          </p:cNvSpPr>
+          <p:nvPr>
+            <p:ph type="sldNum" sz="quarter" idx="12"/>
+          </p:nvPr>
+        </p:nvSpPr>
+        <p:spPr/>
+        <p:txBody>
+          <a:bodyPr/>
+          <a:lstStyle/>
+          <a:p>
+            <a:fld id="{A2E06AC6-F717-4067-8E7D-0419126E5B27}" type="slidenum">
+              <a:rPr lang="es-ES" smtClean="0"/>
+              <a:t>1</a:t>
+            </a:fld>
+            <a:endParaRPr lang="es-ES"/>
+          </a:p>
+        </p:txBody>
+      </p:sp>
     </p:spTree>
     <p:extLst>
       <p:ext uri="{BB962C8B-B14F-4D97-AF65-F5344CB8AC3E}">
@@ -4153,47 +4271,12 @@
           </a:p>
         </p:txBody>
       </p:sp>
-      <p:sp>
-        <p:nvSpPr>
-          <p:cNvPr id="6" name="CuadroTexto 5">
+      <p:pic>
+        <p:nvPicPr>
+          <p:cNvPr id="5" name="Imagen 4" descr="Diagrama, Esquemático&#10;&#10;El contenido generado por IA puede ser incorrecto.">
             <a:extLst>
               <a:ext uri="{FF2B5EF4-FFF2-40B4-BE49-F238E27FC236}">
-                <a16:creationId xmlns:a16="http://schemas.microsoft.com/office/drawing/2014/main" id="{13763716-600A-E106-8EF3-1180A92CF5B8}"/>
-              </a:ext>
-            </a:extLst>
-          </p:cNvPr>
-          <p:cNvSpPr txBox="1"/>
-          <p:nvPr/>
-        </p:nvSpPr>
-        <p:spPr>
-          <a:xfrm>
-            <a:off x="11440160" y="6410960"/>
-            <a:ext cx="528320" cy="369332"/>
-          </a:xfrm>
-          <a:prstGeom prst="rect">
-            <a:avLst/>
-          </a:prstGeom>
-          <a:noFill/>
-        </p:spPr>
-        <p:txBody>
-          <a:bodyPr wrap="square" rtlCol="0">
-            <a:spAutoFit/>
-          </a:bodyPr>
-          <a:lstStyle/>
-          <a:p>
-            <a:r>
-              <a:rPr lang="es-ES" dirty="0"/>
-              <a:t>10</a:t>
-            </a:r>
-          </a:p>
-        </p:txBody>
-      </p:sp>
-      <p:pic>
-        <p:nvPicPr>
-          <p:cNvPr id="4" name="Imagen 3">
-            <a:extLst>
-              <a:ext uri="{FF2B5EF4-FFF2-40B4-BE49-F238E27FC236}">
-                <a16:creationId xmlns:a16="http://schemas.microsoft.com/office/drawing/2014/main" id="{51C93DE1-8D77-A86D-A412-B40EDE9F0158}"/>
+                <a16:creationId xmlns:a16="http://schemas.microsoft.com/office/drawing/2014/main" id="{E4201B0C-9362-70EA-023B-23762C546C79}"/>
               </a:ext>
             </a:extLst>
           </p:cNvPr>
@@ -4203,21 +4286,284 @@
           <p:nvPr/>
         </p:nvPicPr>
         <p:blipFill>
-          <a:blip r:embed="rId2"/>
+          <a:blip r:embed="rId2">
+            <a:extLst>
+              <a:ext uri="{28A0092B-C50C-407E-A947-70E740481C1C}">
+                <a14:useLocalDpi xmlns:a14="http://schemas.microsoft.com/office/drawing/2010/main" val="0"/>
+              </a:ext>
+            </a:extLst>
+          </a:blip>
           <a:stretch>
             <a:fillRect/>
           </a:stretch>
         </p:blipFill>
         <p:spPr>
           <a:xfrm>
-            <a:off x="1639744" y="601532"/>
-            <a:ext cx="8695768" cy="5994094"/>
+            <a:off x="223520" y="874276"/>
+            <a:ext cx="7721659" cy="5536684"/>
           </a:xfrm>
           <a:prstGeom prst="rect">
             <a:avLst/>
           </a:prstGeom>
+          <a:solidFill>
+            <a:srgbClr val="FFFFFF">
+              <a:shade val="85000"/>
+            </a:srgbClr>
+          </a:solidFill>
+          <a:ln w="88900" cap="sq">
+            <a:solidFill>
+              <a:srgbClr val="FFFFFF"/>
+            </a:solidFill>
+            <a:miter lim="800000"/>
+          </a:ln>
+          <a:effectLst>
+            <a:outerShdw blurRad="55000" dist="18000" dir="5400000" algn="tl" rotWithShape="0">
+              <a:srgbClr val="000000">
+                <a:alpha val="40000"/>
+              </a:srgbClr>
+            </a:outerShdw>
+          </a:effectLst>
+          <a:scene3d>
+            <a:camera prst="orthographicFront"/>
+            <a:lightRig rig="twoPt" dir="t">
+              <a:rot lat="0" lon="0" rev="7200000"/>
+            </a:lightRig>
+          </a:scene3d>
+          <a:sp3d>
+            <a:bevelT w="25400" h="19050"/>
+            <a:contourClr>
+              <a:srgbClr val="FFFFFF"/>
+            </a:contourClr>
+          </a:sp3d>
         </p:spPr>
       </p:pic>
+      <p:pic>
+        <p:nvPicPr>
+          <p:cNvPr id="8" name="Imagen 7" descr="Diagrama, Esquemático&#10;&#10;El contenido generado por IA puede ser incorrecto.">
+            <a:extLst>
+              <a:ext uri="{FF2B5EF4-FFF2-40B4-BE49-F238E27FC236}">
+                <a16:creationId xmlns:a16="http://schemas.microsoft.com/office/drawing/2014/main" id="{35447A25-46FC-949C-34B4-93C8C9970931}"/>
+              </a:ext>
+            </a:extLst>
+          </p:cNvPr>
+          <p:cNvPicPr>
+            <a:picLocks noChangeAspect="1"/>
+          </p:cNvPicPr>
+          <p:nvPr/>
+        </p:nvPicPr>
+        <p:blipFill>
+          <a:blip r:embed="rId3">
+            <a:extLst>
+              <a:ext uri="{28A0092B-C50C-407E-A947-70E740481C1C}">
+                <a14:useLocalDpi xmlns:a14="http://schemas.microsoft.com/office/drawing/2010/main" val="0"/>
+              </a:ext>
+            </a:extLst>
+          </a:blip>
+          <a:stretch>
+            <a:fillRect/>
+          </a:stretch>
+        </p:blipFill>
+        <p:spPr>
+          <a:xfrm>
+            <a:off x="8088630" y="874276"/>
+            <a:ext cx="3879850" cy="1790700"/>
+          </a:xfrm>
+          <a:prstGeom prst="rect">
+            <a:avLst/>
+          </a:prstGeom>
+          <a:solidFill>
+            <a:srgbClr val="FFFFFF">
+              <a:shade val="85000"/>
+            </a:srgbClr>
+          </a:solidFill>
+          <a:ln w="88900" cap="sq">
+            <a:solidFill>
+              <a:srgbClr val="FFFFFF"/>
+            </a:solidFill>
+            <a:miter lim="800000"/>
+          </a:ln>
+          <a:effectLst>
+            <a:outerShdw blurRad="55000" dist="18000" dir="5400000" algn="tl" rotWithShape="0">
+              <a:srgbClr val="000000">
+                <a:alpha val="40000"/>
+              </a:srgbClr>
+            </a:outerShdw>
+          </a:effectLst>
+          <a:scene3d>
+            <a:camera prst="orthographicFront"/>
+            <a:lightRig rig="twoPt" dir="t">
+              <a:rot lat="0" lon="0" rev="7200000"/>
+            </a:lightRig>
+          </a:scene3d>
+          <a:sp3d>
+            <a:bevelT w="25400" h="19050"/>
+            <a:contourClr>
+              <a:srgbClr val="FFFFFF"/>
+            </a:contourClr>
+          </a:sp3d>
+        </p:spPr>
+      </p:pic>
+      <p:pic>
+        <p:nvPicPr>
+          <p:cNvPr id="10" name="Imagen 9" descr="Diagrama, Esquemático&#10;&#10;El contenido generado por IA puede ser incorrecto.">
+            <a:extLst>
+              <a:ext uri="{FF2B5EF4-FFF2-40B4-BE49-F238E27FC236}">
+                <a16:creationId xmlns:a16="http://schemas.microsoft.com/office/drawing/2014/main" id="{2DE20352-3883-4F1F-D891-31567F639C42}"/>
+              </a:ext>
+            </a:extLst>
+          </p:cNvPr>
+          <p:cNvPicPr>
+            <a:picLocks noChangeAspect="1"/>
+          </p:cNvPicPr>
+          <p:nvPr/>
+        </p:nvPicPr>
+        <p:blipFill>
+          <a:blip r:embed="rId4">
+            <a:extLst>
+              <a:ext uri="{28A0092B-C50C-407E-A947-70E740481C1C}">
+                <a14:useLocalDpi xmlns:a14="http://schemas.microsoft.com/office/drawing/2010/main" val="0"/>
+              </a:ext>
+            </a:extLst>
+          </a:blip>
+          <a:stretch>
+            <a:fillRect/>
+          </a:stretch>
+        </p:blipFill>
+        <p:spPr>
+          <a:xfrm>
+            <a:off x="8088630" y="2939420"/>
+            <a:ext cx="3879850" cy="1863349"/>
+          </a:xfrm>
+          <a:prstGeom prst="rect">
+            <a:avLst/>
+          </a:prstGeom>
+          <a:solidFill>
+            <a:srgbClr val="FFFFFF">
+              <a:shade val="85000"/>
+            </a:srgbClr>
+          </a:solidFill>
+          <a:ln w="88900" cap="sq">
+            <a:solidFill>
+              <a:srgbClr val="FFFFFF"/>
+            </a:solidFill>
+            <a:miter lim="800000"/>
+          </a:ln>
+          <a:effectLst>
+            <a:outerShdw blurRad="55000" dist="18000" dir="5400000" algn="tl" rotWithShape="0">
+              <a:srgbClr val="000000">
+                <a:alpha val="40000"/>
+              </a:srgbClr>
+            </a:outerShdw>
+          </a:effectLst>
+          <a:scene3d>
+            <a:camera prst="orthographicFront"/>
+            <a:lightRig rig="twoPt" dir="t">
+              <a:rot lat="0" lon="0" rev="7200000"/>
+            </a:lightRig>
+          </a:scene3d>
+          <a:sp3d>
+            <a:bevelT w="25400" h="19050"/>
+            <a:contourClr>
+              <a:srgbClr val="FFFFFF"/>
+            </a:contourClr>
+          </a:sp3d>
+        </p:spPr>
+      </p:pic>
+      <p:pic>
+        <p:nvPicPr>
+          <p:cNvPr id="12" name="Imagen 11" descr="Diagrama, Esquemático&#10;&#10;El contenido generado por IA puede ser incorrecto.">
+            <a:extLst>
+              <a:ext uri="{FF2B5EF4-FFF2-40B4-BE49-F238E27FC236}">
+                <a16:creationId xmlns:a16="http://schemas.microsoft.com/office/drawing/2014/main" id="{44B7ADB5-83D7-420D-0DE7-B9D1A7B9F360}"/>
+              </a:ext>
+            </a:extLst>
+          </p:cNvPr>
+          <p:cNvPicPr>
+            <a:picLocks noChangeAspect="1"/>
+          </p:cNvPicPr>
+          <p:nvPr/>
+        </p:nvPicPr>
+        <p:blipFill>
+          <a:blip r:embed="rId5">
+            <a:extLst>
+              <a:ext uri="{28A0092B-C50C-407E-A947-70E740481C1C}">
+                <a14:useLocalDpi xmlns:a14="http://schemas.microsoft.com/office/drawing/2010/main" val="0"/>
+              </a:ext>
+            </a:extLst>
+          </a:blip>
+          <a:stretch>
+            <a:fillRect/>
+          </a:stretch>
+        </p:blipFill>
+        <p:spPr>
+          <a:xfrm>
+            <a:off x="8087129" y="5077214"/>
+            <a:ext cx="3881351" cy="1333746"/>
+          </a:xfrm>
+          <a:prstGeom prst="rect">
+            <a:avLst/>
+          </a:prstGeom>
+          <a:solidFill>
+            <a:srgbClr val="FFFFFF">
+              <a:shade val="85000"/>
+            </a:srgbClr>
+          </a:solidFill>
+          <a:ln w="88900" cap="sq">
+            <a:solidFill>
+              <a:srgbClr val="FFFFFF"/>
+            </a:solidFill>
+            <a:miter lim="800000"/>
+          </a:ln>
+          <a:effectLst>
+            <a:outerShdw blurRad="55000" dist="18000" dir="5400000" algn="tl" rotWithShape="0">
+              <a:srgbClr val="000000">
+                <a:alpha val="40000"/>
+              </a:srgbClr>
+            </a:outerShdw>
+          </a:effectLst>
+          <a:scene3d>
+            <a:camera prst="orthographicFront"/>
+            <a:lightRig rig="twoPt" dir="t">
+              <a:rot lat="0" lon="0" rev="7200000"/>
+            </a:lightRig>
+          </a:scene3d>
+          <a:sp3d>
+            <a:bevelT w="25400" h="19050"/>
+            <a:contourClr>
+              <a:srgbClr val="FFFFFF"/>
+            </a:contourClr>
+          </a:sp3d>
+        </p:spPr>
+      </p:pic>
+      <p:sp>
+        <p:nvSpPr>
+          <p:cNvPr id="13" name="Marcador de número de diapositiva 12">
+            <a:extLst>
+              <a:ext uri="{FF2B5EF4-FFF2-40B4-BE49-F238E27FC236}">
+                <a16:creationId xmlns:a16="http://schemas.microsoft.com/office/drawing/2014/main" id="{9F952E9B-C4D9-58E8-CA13-1C108BDD2713}"/>
+              </a:ext>
+            </a:extLst>
+          </p:cNvPr>
+          <p:cNvSpPr>
+            <a:spLocks noGrp="1"/>
+          </p:cNvSpPr>
+          <p:nvPr>
+            <p:ph type="sldNum" sz="quarter" idx="12"/>
+          </p:nvPr>
+        </p:nvSpPr>
+        <p:spPr/>
+        <p:txBody>
+          <a:bodyPr/>
+          <a:lstStyle/>
+          <a:p>
+            <a:fld id="{A2E06AC6-F717-4067-8E7D-0419126E5B27}" type="slidenum">
+              <a:rPr lang="es-ES" smtClean="0"/>
+              <a:t>10</a:t>
+            </a:fld>
+            <a:endParaRPr lang="es-ES"/>
+          </a:p>
+        </p:txBody>
+      </p:sp>
     </p:spTree>
     <p:extLst>
       <p:ext uri="{BB962C8B-B14F-4D97-AF65-F5344CB8AC3E}">
@@ -4232,6 +4578,1028 @@
 </file>
 
 <file path=ppt/slides/slide11.xml><?xml version="1.0" encoding="utf-8"?>
+<p:sld xmlns:a="http://schemas.openxmlformats.org/drawingml/2006/main" xmlns:r="http://schemas.openxmlformats.org/officeDocument/2006/relationships" xmlns:p="http://schemas.openxmlformats.org/presentationml/2006/main">
+  <p:cSld>
+    <p:spTree>
+      <p:nvGrpSpPr>
+        <p:cNvPr id="1" name=""/>
+        <p:cNvGrpSpPr/>
+        <p:nvPr/>
+      </p:nvGrpSpPr>
+      <p:grpSpPr>
+        <a:xfrm>
+          <a:off x="0" y="0"/>
+          <a:ext cx="0" cy="0"/>
+          <a:chOff x="0" y="0"/>
+          <a:chExt cx="0" cy="0"/>
+        </a:xfrm>
+      </p:grpSpPr>
+      <p:sp>
+        <p:nvSpPr>
+          <p:cNvPr id="2" name="Título 1">
+            <a:extLst>
+              <a:ext uri="{FF2B5EF4-FFF2-40B4-BE49-F238E27FC236}">
+                <a16:creationId xmlns:a16="http://schemas.microsoft.com/office/drawing/2014/main" id="{2F345932-3A88-15AC-E8A4-B0AAC03AC129}"/>
+              </a:ext>
+            </a:extLst>
+          </p:cNvPr>
+          <p:cNvSpPr>
+            <a:spLocks noGrp="1"/>
+          </p:cNvSpPr>
+          <p:nvPr>
+            <p:ph type="title"/>
+          </p:nvPr>
+        </p:nvSpPr>
+        <p:spPr/>
+        <p:txBody>
+          <a:bodyPr/>
+          <a:lstStyle/>
+          <a:p>
+            <a:r>
+              <a:rPr lang="es-ES" dirty="0"/>
+              <a:t>Cambios</a:t>
+            </a:r>
+          </a:p>
+        </p:txBody>
+      </p:sp>
+      <p:pic>
+        <p:nvPicPr>
+          <p:cNvPr id="9" name="Imagen 8" descr="Diagrama, Esquemático&#10;&#10;El contenido generado por IA puede ser incorrecto.">
+            <a:extLst>
+              <a:ext uri="{FF2B5EF4-FFF2-40B4-BE49-F238E27FC236}">
+                <a16:creationId xmlns:a16="http://schemas.microsoft.com/office/drawing/2014/main" id="{79E5F710-5B25-CD96-AAA5-FA1454717FC7}"/>
+              </a:ext>
+            </a:extLst>
+          </p:cNvPr>
+          <p:cNvPicPr>
+            <a:picLocks noChangeAspect="1"/>
+          </p:cNvPicPr>
+          <p:nvPr/>
+        </p:nvPicPr>
+        <p:blipFill>
+          <a:blip r:embed="rId2">
+            <a:extLst>
+              <a:ext uri="{28A0092B-C50C-407E-A947-70E740481C1C}">
+                <a14:useLocalDpi xmlns:a14="http://schemas.microsoft.com/office/drawing/2010/main" val="0"/>
+              </a:ext>
+            </a:extLst>
+          </a:blip>
+          <a:stretch>
+            <a:fillRect/>
+          </a:stretch>
+        </p:blipFill>
+        <p:spPr>
+          <a:xfrm>
+            <a:off x="2362199" y="2623309"/>
+            <a:ext cx="3790950" cy="2715140"/>
+          </a:xfrm>
+          <a:prstGeom prst="rect">
+            <a:avLst/>
+          </a:prstGeom>
+          <a:solidFill>
+            <a:srgbClr val="FFFFFF">
+              <a:shade val="85000"/>
+            </a:srgbClr>
+          </a:solidFill>
+          <a:ln w="88900" cap="sq">
+            <a:solidFill>
+              <a:srgbClr val="FFFFFF"/>
+            </a:solidFill>
+            <a:miter lim="800000"/>
+          </a:ln>
+          <a:effectLst>
+            <a:outerShdw blurRad="55000" dist="18000" dir="5400000" algn="tl" rotWithShape="0">
+              <a:srgbClr val="000000">
+                <a:alpha val="40000"/>
+              </a:srgbClr>
+            </a:outerShdw>
+          </a:effectLst>
+          <a:scene3d>
+            <a:camera prst="orthographicFront"/>
+            <a:lightRig rig="twoPt" dir="t">
+              <a:rot lat="0" lon="0" rev="7200000"/>
+            </a:lightRig>
+          </a:scene3d>
+          <a:sp3d>
+            <a:bevelT w="25400" h="19050"/>
+            <a:contourClr>
+              <a:srgbClr val="FFFFFF"/>
+            </a:contourClr>
+          </a:sp3d>
+        </p:spPr>
+      </p:pic>
+      <p:pic>
+        <p:nvPicPr>
+          <p:cNvPr id="11" name="Imagen 10" descr="Calendario&#10;&#10;El contenido generado por IA puede ser incorrecto.">
+            <a:extLst>
+              <a:ext uri="{FF2B5EF4-FFF2-40B4-BE49-F238E27FC236}">
+                <a16:creationId xmlns:a16="http://schemas.microsoft.com/office/drawing/2014/main" id="{13B37A8C-5984-EF08-6CF6-2A81EA2EC69A}"/>
+              </a:ext>
+            </a:extLst>
+          </p:cNvPr>
+          <p:cNvPicPr>
+            <a:picLocks noChangeAspect="1"/>
+          </p:cNvPicPr>
+          <p:nvPr/>
+        </p:nvPicPr>
+        <p:blipFill>
+          <a:blip r:embed="rId3">
+            <a:extLst>
+              <a:ext uri="{28A0092B-C50C-407E-A947-70E740481C1C}">
+                <a14:useLocalDpi xmlns:a14="http://schemas.microsoft.com/office/drawing/2010/main" val="0"/>
+              </a:ext>
+            </a:extLst>
+          </a:blip>
+          <a:stretch>
+            <a:fillRect/>
+          </a:stretch>
+        </p:blipFill>
+        <p:spPr>
+          <a:xfrm>
+            <a:off x="6486525" y="3086642"/>
+            <a:ext cx="5372100" cy="1479740"/>
+          </a:xfrm>
+          <a:prstGeom prst="rect">
+            <a:avLst/>
+          </a:prstGeom>
+          <a:solidFill>
+            <a:srgbClr val="FFFFFF">
+              <a:shade val="85000"/>
+            </a:srgbClr>
+          </a:solidFill>
+          <a:ln w="88900" cap="sq">
+            <a:solidFill>
+              <a:srgbClr val="FFFFFF"/>
+            </a:solidFill>
+            <a:miter lim="800000"/>
+          </a:ln>
+          <a:effectLst>
+            <a:outerShdw blurRad="55000" dist="18000" dir="5400000" algn="tl" rotWithShape="0">
+              <a:srgbClr val="000000">
+                <a:alpha val="40000"/>
+              </a:srgbClr>
+            </a:outerShdw>
+          </a:effectLst>
+          <a:scene3d>
+            <a:camera prst="orthographicFront"/>
+            <a:lightRig rig="twoPt" dir="t">
+              <a:rot lat="0" lon="0" rev="7200000"/>
+            </a:lightRig>
+          </a:scene3d>
+          <a:sp3d>
+            <a:bevelT w="25400" h="19050"/>
+            <a:contourClr>
+              <a:srgbClr val="FFFFFF"/>
+            </a:contourClr>
+          </a:sp3d>
+        </p:spPr>
+      </p:pic>
+      <p:pic>
+        <p:nvPicPr>
+          <p:cNvPr id="15" name="Imagen 14" descr="Diagrama, Esquemático&#10;&#10;El contenido generado por IA puede ser incorrecto.">
+            <a:extLst>
+              <a:ext uri="{FF2B5EF4-FFF2-40B4-BE49-F238E27FC236}">
+                <a16:creationId xmlns:a16="http://schemas.microsoft.com/office/drawing/2014/main" id="{0410CFE7-CCD8-D0C5-4E6D-506C76EFD939}"/>
+              </a:ext>
+            </a:extLst>
+          </p:cNvPr>
+          <p:cNvPicPr>
+            <a:picLocks noChangeAspect="1"/>
+          </p:cNvPicPr>
+          <p:nvPr/>
+        </p:nvPicPr>
+        <p:blipFill>
+          <a:blip r:embed="rId4">
+            <a:extLst>
+              <a:ext uri="{28A0092B-C50C-407E-A947-70E740481C1C}">
+                <a14:useLocalDpi xmlns:a14="http://schemas.microsoft.com/office/drawing/2010/main" val="0"/>
+              </a:ext>
+            </a:extLst>
+          </a:blip>
+          <a:stretch>
+            <a:fillRect/>
+          </a:stretch>
+        </p:blipFill>
+        <p:spPr>
+          <a:xfrm>
+            <a:off x="6903272" y="530060"/>
+            <a:ext cx="4450528" cy="2321255"/>
+          </a:xfrm>
+          <a:prstGeom prst="rect">
+            <a:avLst/>
+          </a:prstGeom>
+          <a:solidFill>
+            <a:srgbClr val="FFFFFF">
+              <a:shade val="85000"/>
+            </a:srgbClr>
+          </a:solidFill>
+          <a:ln w="88900" cap="sq">
+            <a:solidFill>
+              <a:srgbClr val="FFFFFF"/>
+            </a:solidFill>
+            <a:miter lim="800000"/>
+          </a:ln>
+          <a:effectLst>
+            <a:outerShdw blurRad="55000" dist="18000" dir="5400000" algn="tl" rotWithShape="0">
+              <a:srgbClr val="000000">
+                <a:alpha val="40000"/>
+              </a:srgbClr>
+            </a:outerShdw>
+          </a:effectLst>
+          <a:scene3d>
+            <a:camera prst="orthographicFront"/>
+            <a:lightRig rig="twoPt" dir="t">
+              <a:rot lat="0" lon="0" rev="7200000"/>
+            </a:lightRig>
+          </a:scene3d>
+          <a:sp3d>
+            <a:bevelT w="25400" h="19050"/>
+            <a:contourClr>
+              <a:srgbClr val="FFFFFF"/>
+            </a:contourClr>
+          </a:sp3d>
+        </p:spPr>
+      </p:pic>
+      <p:pic>
+        <p:nvPicPr>
+          <p:cNvPr id="17" name="Imagen 16" descr="Una captura de pantalla de un celular&#10;&#10;El contenido generado por IA puede ser incorrecto.">
+            <a:extLst>
+              <a:ext uri="{FF2B5EF4-FFF2-40B4-BE49-F238E27FC236}">
+                <a16:creationId xmlns:a16="http://schemas.microsoft.com/office/drawing/2014/main" id="{1B95D635-937F-5FDF-47AD-4B582417D85F}"/>
+              </a:ext>
+            </a:extLst>
+          </p:cNvPr>
+          <p:cNvPicPr>
+            <a:picLocks noChangeAspect="1"/>
+          </p:cNvPicPr>
+          <p:nvPr/>
+        </p:nvPicPr>
+        <p:blipFill>
+          <a:blip r:embed="rId5">
+            <a:extLst>
+              <a:ext uri="{28A0092B-C50C-407E-A947-70E740481C1C}">
+                <a14:useLocalDpi xmlns:a14="http://schemas.microsoft.com/office/drawing/2010/main" val="0"/>
+              </a:ext>
+            </a:extLst>
+          </a:blip>
+          <a:stretch>
+            <a:fillRect/>
+          </a:stretch>
+        </p:blipFill>
+        <p:spPr>
+          <a:xfrm>
+            <a:off x="229681" y="2623309"/>
+            <a:ext cx="1799141" cy="2714133"/>
+          </a:xfrm>
+          <a:prstGeom prst="rect">
+            <a:avLst/>
+          </a:prstGeom>
+          <a:solidFill>
+            <a:srgbClr val="FFFFFF">
+              <a:shade val="85000"/>
+            </a:srgbClr>
+          </a:solidFill>
+          <a:ln w="88900" cap="sq">
+            <a:solidFill>
+              <a:srgbClr val="FFFFFF"/>
+            </a:solidFill>
+            <a:miter lim="800000"/>
+          </a:ln>
+          <a:effectLst>
+            <a:outerShdw blurRad="55000" dist="18000" dir="5400000" algn="tl" rotWithShape="0">
+              <a:srgbClr val="000000">
+                <a:alpha val="40000"/>
+              </a:srgbClr>
+            </a:outerShdw>
+          </a:effectLst>
+          <a:scene3d>
+            <a:camera prst="orthographicFront"/>
+            <a:lightRig rig="twoPt" dir="t">
+              <a:rot lat="0" lon="0" rev="7200000"/>
+            </a:lightRig>
+          </a:scene3d>
+          <a:sp3d>
+            <a:bevelT w="25400" h="19050"/>
+            <a:contourClr>
+              <a:srgbClr val="FFFFFF"/>
+            </a:contourClr>
+          </a:sp3d>
+        </p:spPr>
+      </p:pic>
+      <p:pic>
+        <p:nvPicPr>
+          <p:cNvPr id="19" name="Imagen 18" descr="Diagrama, Esquemático&#10;&#10;El contenido generado por IA puede ser incorrecto.">
+            <a:extLst>
+              <a:ext uri="{FF2B5EF4-FFF2-40B4-BE49-F238E27FC236}">
+                <a16:creationId xmlns:a16="http://schemas.microsoft.com/office/drawing/2014/main" id="{E3CA529D-01B9-B926-9CC6-9A5EDE3D5E83}"/>
+              </a:ext>
+            </a:extLst>
+          </p:cNvPr>
+          <p:cNvPicPr>
+            <a:picLocks noChangeAspect="1"/>
+          </p:cNvPicPr>
+          <p:nvPr/>
+        </p:nvPicPr>
+        <p:blipFill>
+          <a:blip r:embed="rId6">
+            <a:extLst>
+              <a:ext uri="{28A0092B-C50C-407E-A947-70E740481C1C}">
+                <a14:useLocalDpi xmlns:a14="http://schemas.microsoft.com/office/drawing/2010/main" val="0"/>
+              </a:ext>
+            </a:extLst>
+          </a:blip>
+          <a:stretch>
+            <a:fillRect/>
+          </a:stretch>
+        </p:blipFill>
+        <p:spPr>
+          <a:xfrm>
+            <a:off x="6486525" y="4848201"/>
+            <a:ext cx="5372099" cy="1435012"/>
+          </a:xfrm>
+          <a:prstGeom prst="rect">
+            <a:avLst/>
+          </a:prstGeom>
+          <a:solidFill>
+            <a:srgbClr val="FFFFFF">
+              <a:shade val="85000"/>
+            </a:srgbClr>
+          </a:solidFill>
+          <a:ln w="88900" cap="sq">
+            <a:solidFill>
+              <a:srgbClr val="FFFFFF"/>
+            </a:solidFill>
+            <a:miter lim="800000"/>
+          </a:ln>
+          <a:effectLst>
+            <a:outerShdw blurRad="55000" dist="18000" dir="5400000" algn="tl" rotWithShape="0">
+              <a:srgbClr val="000000">
+                <a:alpha val="40000"/>
+              </a:srgbClr>
+            </a:outerShdw>
+          </a:effectLst>
+          <a:scene3d>
+            <a:camera prst="orthographicFront"/>
+            <a:lightRig rig="twoPt" dir="t">
+              <a:rot lat="0" lon="0" rev="7200000"/>
+            </a:lightRig>
+          </a:scene3d>
+          <a:sp3d>
+            <a:bevelT w="25400" h="19050"/>
+            <a:contourClr>
+              <a:srgbClr val="FFFFFF"/>
+            </a:contourClr>
+          </a:sp3d>
+        </p:spPr>
+      </p:pic>
+      <p:sp>
+        <p:nvSpPr>
+          <p:cNvPr id="21" name="Marcador de número de diapositiva 20">
+            <a:extLst>
+              <a:ext uri="{FF2B5EF4-FFF2-40B4-BE49-F238E27FC236}">
+                <a16:creationId xmlns:a16="http://schemas.microsoft.com/office/drawing/2014/main" id="{DD33E920-133D-ECC4-DADF-763BDAC9C6BF}"/>
+              </a:ext>
+            </a:extLst>
+          </p:cNvPr>
+          <p:cNvSpPr>
+            <a:spLocks noGrp="1"/>
+          </p:cNvSpPr>
+          <p:nvPr>
+            <p:ph type="sldNum" sz="quarter" idx="12"/>
+          </p:nvPr>
+        </p:nvSpPr>
+        <p:spPr/>
+        <p:txBody>
+          <a:bodyPr/>
+          <a:lstStyle/>
+          <a:p>
+            <a:fld id="{A2E06AC6-F717-4067-8E7D-0419126E5B27}" type="slidenum">
+              <a:rPr lang="es-ES" smtClean="0"/>
+              <a:t>11</a:t>
+            </a:fld>
+            <a:endParaRPr lang="es-ES"/>
+          </a:p>
+        </p:txBody>
+      </p:sp>
+    </p:spTree>
+    <p:extLst>
+      <p:ext uri="{BB962C8B-B14F-4D97-AF65-F5344CB8AC3E}">
+        <p14:creationId xmlns:p14="http://schemas.microsoft.com/office/powerpoint/2010/main" val="2887604475"/>
+      </p:ext>
+    </p:extLst>
+  </p:cSld>
+  <p:clrMapOvr>
+    <a:masterClrMapping/>
+  </p:clrMapOvr>
+</p:sld>
+</file>
+
+<file path=ppt/slides/slide12.xml><?xml version="1.0" encoding="utf-8"?>
+<p:sld xmlns:a="http://schemas.openxmlformats.org/drawingml/2006/main" xmlns:r="http://schemas.openxmlformats.org/officeDocument/2006/relationships" xmlns:p="http://schemas.openxmlformats.org/presentationml/2006/main">
+  <p:cSld>
+    <p:spTree>
+      <p:nvGrpSpPr>
+        <p:cNvPr id="1" name=""/>
+        <p:cNvGrpSpPr/>
+        <p:nvPr/>
+      </p:nvGrpSpPr>
+      <p:grpSpPr>
+        <a:xfrm>
+          <a:off x="0" y="0"/>
+          <a:ext cx="0" cy="0"/>
+          <a:chOff x="0" y="0"/>
+          <a:chExt cx="0" cy="0"/>
+        </a:xfrm>
+      </p:grpSpPr>
+      <p:sp>
+        <p:nvSpPr>
+          <p:cNvPr id="2" name="Título 1">
+            <a:extLst>
+              <a:ext uri="{FF2B5EF4-FFF2-40B4-BE49-F238E27FC236}">
+                <a16:creationId xmlns:a16="http://schemas.microsoft.com/office/drawing/2014/main" id="{CDF0166C-880F-0478-7D99-DC994C34C324}"/>
+              </a:ext>
+            </a:extLst>
+          </p:cNvPr>
+          <p:cNvSpPr>
+            <a:spLocks noGrp="1"/>
+          </p:cNvSpPr>
+          <p:nvPr>
+            <p:ph type="title"/>
+          </p:nvPr>
+        </p:nvSpPr>
+        <p:spPr/>
+        <p:txBody>
+          <a:bodyPr/>
+          <a:lstStyle/>
+          <a:p>
+            <a:r>
+              <a:rPr lang="es-ES" dirty="0" err="1"/>
+              <a:t>Layout</a:t>
+            </a:r>
+            <a:r>
+              <a:rPr lang="es-ES" dirty="0"/>
+              <a:t> (TOP)</a:t>
+            </a:r>
+          </a:p>
+        </p:txBody>
+      </p:sp>
+      <p:pic>
+        <p:nvPicPr>
+          <p:cNvPr id="7" name="Imagen 6" descr="Imagen de la pantalla de un video juego&#10;&#10;El contenido generado por IA puede ser incorrecto.">
+            <a:extLst>
+              <a:ext uri="{FF2B5EF4-FFF2-40B4-BE49-F238E27FC236}">
+                <a16:creationId xmlns:a16="http://schemas.microsoft.com/office/drawing/2014/main" id="{CBB52FD3-2036-EC83-4E06-C4EC8BA142C3}"/>
+              </a:ext>
+            </a:extLst>
+          </p:cNvPr>
+          <p:cNvPicPr>
+            <a:picLocks noChangeAspect="1"/>
+          </p:cNvPicPr>
+          <p:nvPr/>
+        </p:nvPicPr>
+        <p:blipFill>
+          <a:blip r:embed="rId2">
+            <a:extLst>
+              <a:ext uri="{28A0092B-C50C-407E-A947-70E740481C1C}">
+                <a14:useLocalDpi xmlns:a14="http://schemas.microsoft.com/office/drawing/2010/main" val="0"/>
+              </a:ext>
+            </a:extLst>
+          </a:blip>
+          <a:stretch>
+            <a:fillRect/>
+          </a:stretch>
+        </p:blipFill>
+        <p:spPr>
+          <a:xfrm>
+            <a:off x="1181100" y="1690688"/>
+            <a:ext cx="9829800" cy="4914900"/>
+          </a:xfrm>
+          <a:prstGeom prst="rect">
+            <a:avLst/>
+          </a:prstGeom>
+          <a:solidFill>
+            <a:srgbClr val="FFFFFF">
+              <a:shade val="85000"/>
+            </a:srgbClr>
+          </a:solidFill>
+          <a:ln w="88900" cap="sq">
+            <a:solidFill>
+              <a:srgbClr val="FFFFFF"/>
+            </a:solidFill>
+            <a:miter lim="800000"/>
+          </a:ln>
+          <a:effectLst>
+            <a:outerShdw blurRad="55000" dist="18000" dir="5400000" algn="tl" rotWithShape="0">
+              <a:srgbClr val="000000">
+                <a:alpha val="40000"/>
+              </a:srgbClr>
+            </a:outerShdw>
+          </a:effectLst>
+          <a:scene3d>
+            <a:camera prst="orthographicFront"/>
+            <a:lightRig rig="twoPt" dir="t">
+              <a:rot lat="0" lon="0" rev="7200000"/>
+            </a:lightRig>
+          </a:scene3d>
+          <a:sp3d>
+            <a:bevelT w="25400" h="19050"/>
+            <a:contourClr>
+              <a:srgbClr val="FFFFFF"/>
+            </a:contourClr>
+          </a:sp3d>
+        </p:spPr>
+      </p:pic>
+      <p:sp>
+        <p:nvSpPr>
+          <p:cNvPr id="9" name="Marcador de número de diapositiva 8">
+            <a:extLst>
+              <a:ext uri="{FF2B5EF4-FFF2-40B4-BE49-F238E27FC236}">
+                <a16:creationId xmlns:a16="http://schemas.microsoft.com/office/drawing/2014/main" id="{ABD359A3-AD50-4EC6-0006-AFEAE2DDDD11}"/>
+              </a:ext>
+            </a:extLst>
+          </p:cNvPr>
+          <p:cNvSpPr>
+            <a:spLocks noGrp="1"/>
+          </p:cNvSpPr>
+          <p:nvPr>
+            <p:ph type="sldNum" sz="quarter" idx="12"/>
+          </p:nvPr>
+        </p:nvSpPr>
+        <p:spPr/>
+        <p:txBody>
+          <a:bodyPr/>
+          <a:lstStyle/>
+          <a:p>
+            <a:fld id="{A2E06AC6-F717-4067-8E7D-0419126E5B27}" type="slidenum">
+              <a:rPr lang="es-ES" smtClean="0"/>
+              <a:t>12</a:t>
+            </a:fld>
+            <a:endParaRPr lang="es-ES"/>
+          </a:p>
+        </p:txBody>
+      </p:sp>
+    </p:spTree>
+    <p:extLst>
+      <p:ext uri="{BB962C8B-B14F-4D97-AF65-F5344CB8AC3E}">
+        <p14:creationId xmlns:p14="http://schemas.microsoft.com/office/powerpoint/2010/main" val="522189788"/>
+      </p:ext>
+    </p:extLst>
+  </p:cSld>
+  <p:clrMapOvr>
+    <a:masterClrMapping/>
+  </p:clrMapOvr>
+</p:sld>
+</file>
+
+<file path=ppt/slides/slide13.xml><?xml version="1.0" encoding="utf-8"?>
+<p:sld xmlns:a="http://schemas.openxmlformats.org/drawingml/2006/main" xmlns:r="http://schemas.openxmlformats.org/officeDocument/2006/relationships" xmlns:p="http://schemas.openxmlformats.org/presentationml/2006/main">
+  <p:cSld>
+    <p:spTree>
+      <p:nvGrpSpPr>
+        <p:cNvPr id="1" name=""/>
+        <p:cNvGrpSpPr/>
+        <p:nvPr/>
+      </p:nvGrpSpPr>
+      <p:grpSpPr>
+        <a:xfrm>
+          <a:off x="0" y="0"/>
+          <a:ext cx="0" cy="0"/>
+          <a:chOff x="0" y="0"/>
+          <a:chExt cx="0" cy="0"/>
+        </a:xfrm>
+      </p:grpSpPr>
+      <p:sp>
+        <p:nvSpPr>
+          <p:cNvPr id="2" name="Título 1">
+            <a:extLst>
+              <a:ext uri="{FF2B5EF4-FFF2-40B4-BE49-F238E27FC236}">
+                <a16:creationId xmlns:a16="http://schemas.microsoft.com/office/drawing/2014/main" id="{7F218A1D-5190-5D5C-86F2-C416672DC930}"/>
+              </a:ext>
+            </a:extLst>
+          </p:cNvPr>
+          <p:cNvSpPr>
+            <a:spLocks noGrp="1"/>
+          </p:cNvSpPr>
+          <p:nvPr>
+            <p:ph type="title"/>
+          </p:nvPr>
+        </p:nvSpPr>
+        <p:spPr/>
+        <p:txBody>
+          <a:bodyPr/>
+          <a:lstStyle/>
+          <a:p>
+            <a:r>
+              <a:rPr lang="es-ES" dirty="0"/>
+              <a:t>Bottom</a:t>
+            </a:r>
+          </a:p>
+        </p:txBody>
+      </p:sp>
+      <p:pic>
+        <p:nvPicPr>
+          <p:cNvPr id="7" name="Imagen 6" descr="Imagen de la pantalla de un computador&#10;&#10;El contenido generado por IA puede ser incorrecto.">
+            <a:extLst>
+              <a:ext uri="{FF2B5EF4-FFF2-40B4-BE49-F238E27FC236}">
+                <a16:creationId xmlns:a16="http://schemas.microsoft.com/office/drawing/2014/main" id="{3A39B74C-B492-E7F6-FEE1-994B34B63CDA}"/>
+              </a:ext>
+            </a:extLst>
+          </p:cNvPr>
+          <p:cNvPicPr>
+            <a:picLocks noChangeAspect="1"/>
+          </p:cNvPicPr>
+          <p:nvPr/>
+        </p:nvPicPr>
+        <p:blipFill>
+          <a:blip r:embed="rId2">
+            <a:extLst>
+              <a:ext uri="{28A0092B-C50C-407E-A947-70E740481C1C}">
+                <a14:useLocalDpi xmlns:a14="http://schemas.microsoft.com/office/drawing/2010/main" val="0"/>
+              </a:ext>
+            </a:extLst>
+          </a:blip>
+          <a:stretch>
+            <a:fillRect/>
+          </a:stretch>
+        </p:blipFill>
+        <p:spPr>
+          <a:xfrm>
+            <a:off x="1252537" y="1587500"/>
+            <a:ext cx="9686925" cy="5086350"/>
+          </a:xfrm>
+          <a:prstGeom prst="rect">
+            <a:avLst/>
+          </a:prstGeom>
+          <a:solidFill>
+            <a:srgbClr val="FFFFFF">
+              <a:shade val="85000"/>
+            </a:srgbClr>
+          </a:solidFill>
+          <a:ln w="88900" cap="sq">
+            <a:solidFill>
+              <a:srgbClr val="FFFFFF"/>
+            </a:solidFill>
+            <a:miter lim="800000"/>
+          </a:ln>
+          <a:effectLst>
+            <a:outerShdw blurRad="55000" dist="18000" dir="5400000" algn="tl" rotWithShape="0">
+              <a:srgbClr val="000000">
+                <a:alpha val="40000"/>
+              </a:srgbClr>
+            </a:outerShdw>
+          </a:effectLst>
+          <a:scene3d>
+            <a:camera prst="orthographicFront"/>
+            <a:lightRig rig="twoPt" dir="t">
+              <a:rot lat="0" lon="0" rev="7200000"/>
+            </a:lightRig>
+          </a:scene3d>
+          <a:sp3d>
+            <a:bevelT w="25400" h="19050"/>
+            <a:contourClr>
+              <a:srgbClr val="FFFFFF"/>
+            </a:contourClr>
+          </a:sp3d>
+        </p:spPr>
+      </p:pic>
+      <p:sp>
+        <p:nvSpPr>
+          <p:cNvPr id="9" name="Marcador de número de diapositiva 8">
+            <a:extLst>
+              <a:ext uri="{FF2B5EF4-FFF2-40B4-BE49-F238E27FC236}">
+                <a16:creationId xmlns:a16="http://schemas.microsoft.com/office/drawing/2014/main" id="{ED9EBB2D-5CA1-FA8B-8B27-0BBFB174887C}"/>
+              </a:ext>
+            </a:extLst>
+          </p:cNvPr>
+          <p:cNvSpPr>
+            <a:spLocks noGrp="1"/>
+          </p:cNvSpPr>
+          <p:nvPr>
+            <p:ph type="sldNum" sz="quarter" idx="12"/>
+          </p:nvPr>
+        </p:nvSpPr>
+        <p:spPr/>
+        <p:txBody>
+          <a:bodyPr/>
+          <a:lstStyle/>
+          <a:p>
+            <a:fld id="{A2E06AC6-F717-4067-8E7D-0419126E5B27}" type="slidenum">
+              <a:rPr lang="es-ES" smtClean="0"/>
+              <a:t>13</a:t>
+            </a:fld>
+            <a:endParaRPr lang="es-ES"/>
+          </a:p>
+        </p:txBody>
+      </p:sp>
+    </p:spTree>
+    <p:extLst>
+      <p:ext uri="{BB962C8B-B14F-4D97-AF65-F5344CB8AC3E}">
+        <p14:creationId xmlns:p14="http://schemas.microsoft.com/office/powerpoint/2010/main" val="2863454898"/>
+      </p:ext>
+    </p:extLst>
+  </p:cSld>
+  <p:clrMapOvr>
+    <a:masterClrMapping/>
+  </p:clrMapOvr>
+</p:sld>
+</file>
+
+<file path=ppt/slides/slide14.xml><?xml version="1.0" encoding="utf-8"?>
+<p:sld xmlns:a="http://schemas.openxmlformats.org/drawingml/2006/main" xmlns:r="http://schemas.openxmlformats.org/officeDocument/2006/relationships" xmlns:p="http://schemas.openxmlformats.org/presentationml/2006/main">
+  <p:cSld>
+    <p:spTree>
+      <p:nvGrpSpPr>
+        <p:cNvPr id="1" name=""/>
+        <p:cNvGrpSpPr/>
+        <p:nvPr/>
+      </p:nvGrpSpPr>
+      <p:grpSpPr>
+        <a:xfrm>
+          <a:off x="0" y="0"/>
+          <a:ext cx="0" cy="0"/>
+          <a:chOff x="0" y="0"/>
+          <a:chExt cx="0" cy="0"/>
+        </a:xfrm>
+      </p:grpSpPr>
+      <p:sp>
+        <p:nvSpPr>
+          <p:cNvPr id="2" name="Título 1">
+            <a:extLst>
+              <a:ext uri="{FF2B5EF4-FFF2-40B4-BE49-F238E27FC236}">
+                <a16:creationId xmlns:a16="http://schemas.microsoft.com/office/drawing/2014/main" id="{457D2630-7FDA-5B3D-C07D-C2D6ED264893}"/>
+              </a:ext>
+            </a:extLst>
+          </p:cNvPr>
+          <p:cNvSpPr>
+            <a:spLocks noGrp="1"/>
+          </p:cNvSpPr>
+          <p:nvPr>
+            <p:ph type="title"/>
+          </p:nvPr>
+        </p:nvSpPr>
+        <p:spPr>
+          <a:xfrm>
+            <a:off x="838200" y="347872"/>
+            <a:ext cx="10515600" cy="1325563"/>
+          </a:xfrm>
+        </p:spPr>
+        <p:txBody>
+          <a:bodyPr/>
+          <a:lstStyle/>
+          <a:p>
+            <a:r>
+              <a:rPr lang="es-ES" dirty="0"/>
+              <a:t>Cosas a destacar del </a:t>
+            </a:r>
+            <a:r>
+              <a:rPr lang="es-ES" dirty="0" err="1"/>
+              <a:t>Layout</a:t>
+            </a:r>
+            <a:endParaRPr lang="es-ES" dirty="0"/>
+          </a:p>
+        </p:txBody>
+      </p:sp>
+      <p:pic>
+        <p:nvPicPr>
+          <p:cNvPr id="5" name="Imagen 4" descr="Imagen que contiene llave&#10;&#10;El contenido generado por IA puede ser incorrecto.">
+            <a:extLst>
+              <a:ext uri="{FF2B5EF4-FFF2-40B4-BE49-F238E27FC236}">
+                <a16:creationId xmlns:a16="http://schemas.microsoft.com/office/drawing/2014/main" id="{DC2930A1-E5FF-C70C-6437-82D24E2778A1}"/>
+              </a:ext>
+            </a:extLst>
+          </p:cNvPr>
+          <p:cNvPicPr>
+            <a:picLocks noChangeAspect="1"/>
+          </p:cNvPicPr>
+          <p:nvPr/>
+        </p:nvPicPr>
+        <p:blipFill>
+          <a:blip r:embed="rId2">
+            <a:extLst>
+              <a:ext uri="{28A0092B-C50C-407E-A947-70E740481C1C}">
+                <a14:useLocalDpi xmlns:a14="http://schemas.microsoft.com/office/drawing/2010/main" val="0"/>
+              </a:ext>
+            </a:extLst>
+          </a:blip>
+          <a:stretch>
+            <a:fillRect/>
+          </a:stretch>
+        </p:blipFill>
+        <p:spPr>
+          <a:xfrm>
+            <a:off x="838200" y="1568660"/>
+            <a:ext cx="2806972" cy="2597360"/>
+          </a:xfrm>
+          <a:prstGeom prst="rect">
+            <a:avLst/>
+          </a:prstGeom>
+          <a:solidFill>
+            <a:srgbClr val="FFFFFF">
+              <a:shade val="85000"/>
+            </a:srgbClr>
+          </a:solidFill>
+          <a:ln w="88900" cap="sq">
+            <a:solidFill>
+              <a:srgbClr val="FFFFFF"/>
+            </a:solidFill>
+            <a:miter lim="800000"/>
+          </a:ln>
+          <a:effectLst>
+            <a:outerShdw blurRad="55000" dist="18000" dir="5400000" algn="tl" rotWithShape="0">
+              <a:srgbClr val="000000">
+                <a:alpha val="40000"/>
+              </a:srgbClr>
+            </a:outerShdw>
+          </a:effectLst>
+          <a:scene3d>
+            <a:camera prst="orthographicFront"/>
+            <a:lightRig rig="twoPt" dir="t">
+              <a:rot lat="0" lon="0" rev="7200000"/>
+            </a:lightRig>
+          </a:scene3d>
+          <a:sp3d>
+            <a:bevelT w="25400" h="19050"/>
+            <a:contourClr>
+              <a:srgbClr val="FFFFFF"/>
+            </a:contourClr>
+          </a:sp3d>
+        </p:spPr>
+      </p:pic>
+      <p:pic>
+        <p:nvPicPr>
+          <p:cNvPr id="7" name="Imagen 6" descr="Un dibujo animado con letras&#10;&#10;El contenido generado por IA puede ser incorrecto.">
+            <a:extLst>
+              <a:ext uri="{FF2B5EF4-FFF2-40B4-BE49-F238E27FC236}">
+                <a16:creationId xmlns:a16="http://schemas.microsoft.com/office/drawing/2014/main" id="{958E1ED0-D32A-5BBC-8BC5-6EEB5DE2FD6B}"/>
+              </a:ext>
+            </a:extLst>
+          </p:cNvPr>
+          <p:cNvPicPr>
+            <a:picLocks noChangeAspect="1"/>
+          </p:cNvPicPr>
+          <p:nvPr/>
+        </p:nvPicPr>
+        <p:blipFill>
+          <a:blip r:embed="rId3">
+            <a:extLst>
+              <a:ext uri="{28A0092B-C50C-407E-A947-70E740481C1C}">
+                <a14:useLocalDpi xmlns:a14="http://schemas.microsoft.com/office/drawing/2010/main" val="0"/>
+              </a:ext>
+            </a:extLst>
+          </a:blip>
+          <a:stretch>
+            <a:fillRect/>
+          </a:stretch>
+        </p:blipFill>
+        <p:spPr>
+          <a:xfrm>
+            <a:off x="565286" y="4383839"/>
+            <a:ext cx="3352800" cy="1811001"/>
+          </a:xfrm>
+          <a:prstGeom prst="rect">
+            <a:avLst/>
+          </a:prstGeom>
+          <a:solidFill>
+            <a:srgbClr val="FFFFFF">
+              <a:shade val="85000"/>
+            </a:srgbClr>
+          </a:solidFill>
+          <a:ln w="88900" cap="sq">
+            <a:solidFill>
+              <a:srgbClr val="FFFFFF"/>
+            </a:solidFill>
+            <a:miter lim="800000"/>
+          </a:ln>
+          <a:effectLst>
+            <a:outerShdw blurRad="55000" dist="18000" dir="5400000" algn="tl" rotWithShape="0">
+              <a:srgbClr val="000000">
+                <a:alpha val="40000"/>
+              </a:srgbClr>
+            </a:outerShdw>
+          </a:effectLst>
+          <a:scene3d>
+            <a:camera prst="orthographicFront"/>
+            <a:lightRig rig="twoPt" dir="t">
+              <a:rot lat="0" lon="0" rev="7200000"/>
+            </a:lightRig>
+          </a:scene3d>
+          <a:sp3d>
+            <a:bevelT w="25400" h="19050"/>
+            <a:contourClr>
+              <a:srgbClr val="FFFFFF"/>
+            </a:contourClr>
+          </a:sp3d>
+        </p:spPr>
+      </p:pic>
+      <p:pic>
+        <p:nvPicPr>
+          <p:cNvPr id="9" name="Imagen 8" descr="Imagen de la pantalla de un computador&#10;&#10;El contenido generado por IA puede ser incorrecto.">
+            <a:extLst>
+              <a:ext uri="{FF2B5EF4-FFF2-40B4-BE49-F238E27FC236}">
+                <a16:creationId xmlns:a16="http://schemas.microsoft.com/office/drawing/2014/main" id="{B5D6D53E-5EA5-5070-4122-97525B62F140}"/>
+              </a:ext>
+            </a:extLst>
+          </p:cNvPr>
+          <p:cNvPicPr>
+            <a:picLocks noChangeAspect="1"/>
+          </p:cNvPicPr>
+          <p:nvPr/>
+        </p:nvPicPr>
+        <p:blipFill>
+          <a:blip r:embed="rId4">
+            <a:extLst>
+              <a:ext uri="{28A0092B-C50C-407E-A947-70E740481C1C}">
+                <a14:useLocalDpi xmlns:a14="http://schemas.microsoft.com/office/drawing/2010/main" val="0"/>
+              </a:ext>
+            </a:extLst>
+          </a:blip>
+          <a:stretch>
+            <a:fillRect/>
+          </a:stretch>
+        </p:blipFill>
+        <p:spPr>
+          <a:xfrm>
+            <a:off x="4105275" y="1924050"/>
+            <a:ext cx="7793158" cy="3980131"/>
+          </a:xfrm>
+          <a:prstGeom prst="rect">
+            <a:avLst/>
+          </a:prstGeom>
+          <a:solidFill>
+            <a:srgbClr val="FFFFFF">
+              <a:shade val="85000"/>
+            </a:srgbClr>
+          </a:solidFill>
+          <a:ln w="88900" cap="sq">
+            <a:solidFill>
+              <a:srgbClr val="FFFFFF"/>
+            </a:solidFill>
+            <a:miter lim="800000"/>
+          </a:ln>
+          <a:effectLst>
+            <a:outerShdw blurRad="55000" dist="18000" dir="5400000" algn="tl" rotWithShape="0">
+              <a:srgbClr val="000000">
+                <a:alpha val="40000"/>
+              </a:srgbClr>
+            </a:outerShdw>
+          </a:effectLst>
+          <a:scene3d>
+            <a:camera prst="orthographicFront"/>
+            <a:lightRig rig="twoPt" dir="t">
+              <a:rot lat="0" lon="0" rev="7200000"/>
+            </a:lightRig>
+          </a:scene3d>
+          <a:sp3d>
+            <a:bevelT w="25400" h="19050"/>
+            <a:contourClr>
+              <a:srgbClr val="FFFFFF"/>
+            </a:contourClr>
+          </a:sp3d>
+        </p:spPr>
+      </p:pic>
+      <p:sp>
+        <p:nvSpPr>
+          <p:cNvPr id="11" name="Marcador de número de diapositiva 10">
+            <a:extLst>
+              <a:ext uri="{FF2B5EF4-FFF2-40B4-BE49-F238E27FC236}">
+                <a16:creationId xmlns:a16="http://schemas.microsoft.com/office/drawing/2014/main" id="{80DFF0B9-71B5-3A43-1248-D9D41B168C37}"/>
+              </a:ext>
+            </a:extLst>
+          </p:cNvPr>
+          <p:cNvSpPr>
+            <a:spLocks noGrp="1"/>
+          </p:cNvSpPr>
+          <p:nvPr>
+            <p:ph type="sldNum" sz="quarter" idx="12"/>
+          </p:nvPr>
+        </p:nvSpPr>
+        <p:spPr/>
+        <p:txBody>
+          <a:bodyPr/>
+          <a:lstStyle/>
+          <a:p>
+            <a:fld id="{A2E06AC6-F717-4067-8E7D-0419126E5B27}" type="slidenum">
+              <a:rPr lang="es-ES" smtClean="0"/>
+              <a:t>14</a:t>
+            </a:fld>
+            <a:endParaRPr lang="es-ES"/>
+          </a:p>
+        </p:txBody>
+      </p:sp>
+    </p:spTree>
+    <p:extLst>
+      <p:ext uri="{BB962C8B-B14F-4D97-AF65-F5344CB8AC3E}">
+        <p14:creationId xmlns:p14="http://schemas.microsoft.com/office/powerpoint/2010/main" val="3201795306"/>
+      </p:ext>
+    </p:extLst>
+  </p:cSld>
+  <p:clrMapOvr>
+    <a:masterClrMapping/>
+  </p:clrMapOvr>
+</p:sld>
+</file>
+
+<file path=ppt/slides/slide15.xml><?xml version="1.0" encoding="utf-8"?>
 <p:sld xmlns:a="http://schemas.openxmlformats.org/drawingml/2006/main" xmlns:r="http://schemas.openxmlformats.org/officeDocument/2006/relationships" xmlns:p="http://schemas.openxmlformats.org/presentationml/2006/main">
   <p:cSld>
     <p:spTree>
@@ -4279,41 +5647,6 @@
             <a:r>
               <a:rPr lang="es-ES" sz="4000" dirty="0"/>
               <a:t>Simulación del comparador</a:t>
-            </a:r>
-          </a:p>
-        </p:txBody>
-      </p:sp>
-      <p:sp>
-        <p:nvSpPr>
-          <p:cNvPr id="11" name="CuadroTexto 10">
-            <a:extLst>
-              <a:ext uri="{FF2B5EF4-FFF2-40B4-BE49-F238E27FC236}">
-                <a16:creationId xmlns:a16="http://schemas.microsoft.com/office/drawing/2014/main" id="{17D6E5BB-3839-BEFC-96F4-386822D569B0}"/>
-              </a:ext>
-            </a:extLst>
-          </p:cNvPr>
-          <p:cNvSpPr txBox="1"/>
-          <p:nvPr/>
-        </p:nvSpPr>
-        <p:spPr>
-          <a:xfrm>
-            <a:off x="11440160" y="6410960"/>
-            <a:ext cx="528320" cy="369332"/>
-          </a:xfrm>
-          <a:prstGeom prst="rect">
-            <a:avLst/>
-          </a:prstGeom>
-          <a:noFill/>
-        </p:spPr>
-        <p:txBody>
-          <a:bodyPr wrap="square" rtlCol="0">
-            <a:spAutoFit/>
-          </a:bodyPr>
-          <a:lstStyle/>
-          <a:p>
-            <a:r>
-              <a:rPr lang="es-ES" dirty="0"/>
-              <a:t>11</a:t>
             </a:r>
           </a:p>
         </p:txBody>
@@ -4378,6 +5711,35 @@
           </a:prstGeom>
         </p:spPr>
       </p:pic>
+      <p:sp>
+        <p:nvSpPr>
+          <p:cNvPr id="2" name="Marcador de número de diapositiva 1">
+            <a:extLst>
+              <a:ext uri="{FF2B5EF4-FFF2-40B4-BE49-F238E27FC236}">
+                <a16:creationId xmlns:a16="http://schemas.microsoft.com/office/drawing/2014/main" id="{FD68C046-5685-67CD-4159-102D6E2A013C}"/>
+              </a:ext>
+            </a:extLst>
+          </p:cNvPr>
+          <p:cNvSpPr>
+            <a:spLocks noGrp="1"/>
+          </p:cNvSpPr>
+          <p:nvPr>
+            <p:ph type="sldNum" sz="quarter" idx="12"/>
+          </p:nvPr>
+        </p:nvSpPr>
+        <p:spPr/>
+        <p:txBody>
+          <a:bodyPr/>
+          <a:lstStyle/>
+          <a:p>
+            <a:fld id="{A2E06AC6-F717-4067-8E7D-0419126E5B27}" type="slidenum">
+              <a:rPr lang="es-ES" smtClean="0"/>
+              <a:t>15</a:t>
+            </a:fld>
+            <a:endParaRPr lang="es-ES"/>
+          </a:p>
+        </p:txBody>
+      </p:sp>
     </p:spTree>
     <p:extLst>
       <p:ext uri="{BB962C8B-B14F-4D97-AF65-F5344CB8AC3E}">
@@ -4391,7 +5753,7 @@
 </p:sld>
 </file>
 
-<file path=ppt/slides/slide12.xml><?xml version="1.0" encoding="utf-8"?>
+<file path=ppt/slides/slide16.xml><?xml version="1.0" encoding="utf-8"?>
 <p:sld xmlns:a="http://schemas.openxmlformats.org/drawingml/2006/main" xmlns:r="http://schemas.openxmlformats.org/officeDocument/2006/relationships" xmlns:p="http://schemas.openxmlformats.org/presentationml/2006/main">
   <p:cSld>
     <p:spTree>
@@ -4438,41 +5800,6 @@
           </a:prstGeom>
         </p:spPr>
       </p:pic>
-      <p:sp>
-        <p:nvSpPr>
-          <p:cNvPr id="6" name="CuadroTexto 5">
-            <a:extLst>
-              <a:ext uri="{FF2B5EF4-FFF2-40B4-BE49-F238E27FC236}">
-                <a16:creationId xmlns:a16="http://schemas.microsoft.com/office/drawing/2014/main" id="{C91E6253-A2EF-1F45-C215-071E5F10D223}"/>
-              </a:ext>
-            </a:extLst>
-          </p:cNvPr>
-          <p:cNvSpPr txBox="1"/>
-          <p:nvPr/>
-        </p:nvSpPr>
-        <p:spPr>
-          <a:xfrm>
-            <a:off x="11440160" y="6410960"/>
-            <a:ext cx="528320" cy="369332"/>
-          </a:xfrm>
-          <a:prstGeom prst="rect">
-            <a:avLst/>
-          </a:prstGeom>
-          <a:noFill/>
-        </p:spPr>
-        <p:txBody>
-          <a:bodyPr wrap="square" rtlCol="0">
-            <a:spAutoFit/>
-          </a:bodyPr>
-          <a:lstStyle/>
-          <a:p>
-            <a:r>
-              <a:rPr lang="es-ES" dirty="0"/>
-              <a:t>12</a:t>
-            </a:r>
-          </a:p>
-        </p:txBody>
-      </p:sp>
       <p:pic>
         <p:nvPicPr>
           <p:cNvPr id="8" name="Imagen 7">
@@ -4544,6 +5871,35 @@
           </a:p>
         </p:txBody>
       </p:sp>
+      <p:sp>
+        <p:nvSpPr>
+          <p:cNvPr id="2" name="Marcador de número de diapositiva 1">
+            <a:extLst>
+              <a:ext uri="{FF2B5EF4-FFF2-40B4-BE49-F238E27FC236}">
+                <a16:creationId xmlns:a16="http://schemas.microsoft.com/office/drawing/2014/main" id="{EB35059C-957A-4F53-DE30-C322BCF4D030}"/>
+              </a:ext>
+            </a:extLst>
+          </p:cNvPr>
+          <p:cNvSpPr>
+            <a:spLocks noGrp="1"/>
+          </p:cNvSpPr>
+          <p:nvPr>
+            <p:ph type="sldNum" sz="quarter" idx="12"/>
+          </p:nvPr>
+        </p:nvSpPr>
+        <p:spPr/>
+        <p:txBody>
+          <a:bodyPr/>
+          <a:lstStyle/>
+          <a:p>
+            <a:fld id="{A2E06AC6-F717-4067-8E7D-0419126E5B27}" type="slidenum">
+              <a:rPr lang="es-ES" smtClean="0"/>
+              <a:t>16</a:t>
+            </a:fld>
+            <a:endParaRPr lang="es-ES"/>
+          </a:p>
+        </p:txBody>
+      </p:sp>
     </p:spTree>
     <p:extLst>
       <p:ext uri="{BB962C8B-B14F-4D97-AF65-F5344CB8AC3E}">
@@ -4557,7 +5913,7 @@
 </p:sld>
 </file>
 
-<file path=ppt/slides/slide13.xml><?xml version="1.0" encoding="utf-8"?>
+<file path=ppt/slides/slide17.xml><?xml version="1.0" encoding="utf-8"?>
 <p:sld xmlns:a="http://schemas.openxmlformats.org/drawingml/2006/main" xmlns:r="http://schemas.openxmlformats.org/officeDocument/2006/relationships" xmlns:p="http://schemas.openxmlformats.org/presentationml/2006/main">
   <p:cSld>
     <p:spTree>
@@ -4787,36 +6143,30 @@
       </p:sp>
       <p:sp>
         <p:nvSpPr>
-          <p:cNvPr id="4" name="CuadroTexto 3">
+          <p:cNvPr id="5" name="Marcador de número de diapositiva 4">
             <a:extLst>
               <a:ext uri="{FF2B5EF4-FFF2-40B4-BE49-F238E27FC236}">
-                <a16:creationId xmlns:a16="http://schemas.microsoft.com/office/drawing/2014/main" id="{6DE97399-80A2-406C-69BF-562B0191CB15}"/>
+                <a16:creationId xmlns:a16="http://schemas.microsoft.com/office/drawing/2014/main" id="{EF57916E-093B-663C-1CE9-E8DD912BB9B7}"/>
               </a:ext>
             </a:extLst>
           </p:cNvPr>
-          <p:cNvSpPr txBox="1"/>
-          <p:nvPr/>
+          <p:cNvSpPr>
+            <a:spLocks noGrp="1"/>
+          </p:cNvSpPr>
+          <p:nvPr>
+            <p:ph type="sldNum" sz="quarter" idx="12"/>
+          </p:nvPr>
         </p:nvSpPr>
-        <p:spPr>
-          <a:xfrm>
-            <a:off x="11440160" y="6410960"/>
-            <a:ext cx="528320" cy="369332"/>
-          </a:xfrm>
-          <a:prstGeom prst="rect">
-            <a:avLst/>
-          </a:prstGeom>
-          <a:noFill/>
-        </p:spPr>
+        <p:spPr/>
         <p:txBody>
-          <a:bodyPr wrap="square" rtlCol="0">
-            <a:spAutoFit/>
-          </a:bodyPr>
+          <a:bodyPr/>
           <a:lstStyle/>
           <a:p>
-            <a:r>
-              <a:rPr lang="es-ES" dirty="0"/>
-              <a:t>13</a:t>
-            </a:r>
+            <a:fld id="{A2E06AC6-F717-4067-8E7D-0419126E5B27}" type="slidenum">
+              <a:rPr lang="es-ES" smtClean="0"/>
+              <a:t>17</a:t>
+            </a:fld>
+            <a:endParaRPr lang="es-ES"/>
           </a:p>
         </p:txBody>
       </p:sp>
@@ -5604,36 +6954,30 @@
       </p:sp>
       <p:sp>
         <p:nvSpPr>
-          <p:cNvPr id="2" name="CuadroTexto 1">
+          <p:cNvPr id="3" name="Marcador de número de diapositiva 2">
             <a:extLst>
               <a:ext uri="{FF2B5EF4-FFF2-40B4-BE49-F238E27FC236}">
-                <a16:creationId xmlns:a16="http://schemas.microsoft.com/office/drawing/2014/main" id="{A0D398DF-97D9-19B1-F059-931A6AFF9335}"/>
+                <a16:creationId xmlns:a16="http://schemas.microsoft.com/office/drawing/2014/main" id="{8AF7B353-376C-F275-0428-AC71D5496D44}"/>
               </a:ext>
             </a:extLst>
           </p:cNvPr>
-          <p:cNvSpPr txBox="1"/>
-          <p:nvPr/>
+          <p:cNvSpPr>
+            <a:spLocks noGrp="1"/>
+          </p:cNvSpPr>
+          <p:nvPr>
+            <p:ph type="sldNum" sz="quarter" idx="12"/>
+          </p:nvPr>
         </p:nvSpPr>
-        <p:spPr>
-          <a:xfrm>
-            <a:off x="11440160" y="6410960"/>
-            <a:ext cx="528320" cy="369332"/>
-          </a:xfrm>
-          <a:prstGeom prst="rect">
-            <a:avLst/>
-          </a:prstGeom>
-          <a:noFill/>
-        </p:spPr>
+        <p:spPr/>
         <p:txBody>
-          <a:bodyPr wrap="square" rtlCol="0">
-            <a:spAutoFit/>
-          </a:bodyPr>
+          <a:bodyPr/>
           <a:lstStyle/>
           <a:p>
-            <a:r>
-              <a:rPr lang="es-ES" dirty="0"/>
+            <a:fld id="{A2E06AC6-F717-4067-8E7D-0419126E5B27}" type="slidenum">
+              <a:rPr lang="es-ES" smtClean="0"/>
               <a:t>2</a:t>
-            </a:r>
+            </a:fld>
+            <a:endParaRPr lang="es-ES"/>
           </a:p>
         </p:txBody>
       </p:sp>
@@ -6103,36 +7447,30 @@
       </mc:AlternateContent>
       <p:sp>
         <p:nvSpPr>
-          <p:cNvPr id="4" name="CuadroTexto 3">
+          <p:cNvPr id="5" name="Marcador de número de diapositiva 4">
             <a:extLst>
               <a:ext uri="{FF2B5EF4-FFF2-40B4-BE49-F238E27FC236}">
-                <a16:creationId xmlns:a16="http://schemas.microsoft.com/office/drawing/2014/main" id="{3E3AD2F7-B85B-BF78-8D52-103C4B9E06E9}"/>
+                <a16:creationId xmlns:a16="http://schemas.microsoft.com/office/drawing/2014/main" id="{5828E884-68CC-8C56-3DC3-2AD07636565D}"/>
               </a:ext>
             </a:extLst>
           </p:cNvPr>
-          <p:cNvSpPr txBox="1"/>
-          <p:nvPr/>
+          <p:cNvSpPr>
+            <a:spLocks noGrp="1"/>
+          </p:cNvSpPr>
+          <p:nvPr>
+            <p:ph type="sldNum" sz="quarter" idx="12"/>
+          </p:nvPr>
         </p:nvSpPr>
-        <p:spPr>
-          <a:xfrm>
-            <a:off x="11440160" y="6410960"/>
-            <a:ext cx="528320" cy="369332"/>
-          </a:xfrm>
-          <a:prstGeom prst="rect">
-            <a:avLst/>
-          </a:prstGeom>
-          <a:noFill/>
-        </p:spPr>
+        <p:spPr/>
         <p:txBody>
-          <a:bodyPr wrap="square" rtlCol="0">
-            <a:spAutoFit/>
-          </a:bodyPr>
+          <a:bodyPr/>
           <a:lstStyle/>
           <a:p>
-            <a:r>
-              <a:rPr lang="es-ES" dirty="0"/>
+            <a:fld id="{A2E06AC6-F717-4067-8E7D-0419126E5B27}" type="slidenum">
+              <a:rPr lang="es-ES" smtClean="0"/>
               <a:t>3</a:t>
-            </a:r>
+            </a:fld>
+            <a:endParaRPr lang="es-ES"/>
           </a:p>
         </p:txBody>
       </p:sp>
@@ -6188,53 +7526,19 @@
           <a:lstStyle/>
           <a:p>
             <a:r>
-              <a:rPr lang="es-ES" dirty="0"/>
+              <a:rPr lang="es-ES"/>
               <a:t>Diagrama de Bloques</a:t>
             </a:r>
-          </a:p>
-        </p:txBody>
-      </p:sp>
-      <p:sp>
-        <p:nvSpPr>
-          <p:cNvPr id="3" name="CuadroTexto 2">
-            <a:extLst>
-              <a:ext uri="{FF2B5EF4-FFF2-40B4-BE49-F238E27FC236}">
-                <a16:creationId xmlns:a16="http://schemas.microsoft.com/office/drawing/2014/main" id="{CAAF1A12-6E47-08E7-5981-C50F41062CA9}"/>
-              </a:ext>
-            </a:extLst>
-          </p:cNvPr>
-          <p:cNvSpPr txBox="1"/>
-          <p:nvPr/>
-        </p:nvSpPr>
-        <p:spPr>
-          <a:xfrm>
-            <a:off x="11440160" y="6410960"/>
-            <a:ext cx="528320" cy="369332"/>
-          </a:xfrm>
-          <a:prstGeom prst="rect">
-            <a:avLst/>
-          </a:prstGeom>
-          <a:noFill/>
-        </p:spPr>
-        <p:txBody>
-          <a:bodyPr wrap="square" rtlCol="0">
-            <a:spAutoFit/>
-          </a:bodyPr>
-          <a:lstStyle/>
-          <a:p>
-            <a:r>
-              <a:rPr lang="es-ES" dirty="0"/>
-              <a:t>4</a:t>
-            </a:r>
+            <a:endParaRPr lang="es-ES" dirty="0"/>
           </a:p>
         </p:txBody>
       </p:sp>
       <p:pic>
         <p:nvPicPr>
-          <p:cNvPr id="7" name="Imagen 6" descr="Diagrama&#10;&#10;El contenido generado por IA puede ser incorrecto.">
+          <p:cNvPr id="8" name="Imagen 7" descr="Diagrama&#10;&#10;El contenido generado por IA puede ser incorrecto.">
             <a:extLst>
               <a:ext uri="{FF2B5EF4-FFF2-40B4-BE49-F238E27FC236}">
-                <a16:creationId xmlns:a16="http://schemas.microsoft.com/office/drawing/2014/main" id="{EAD9B4D2-6CD9-7BA2-A295-91EE87C4B594}"/>
+                <a16:creationId xmlns:a16="http://schemas.microsoft.com/office/drawing/2014/main" id="{139079BD-65A1-7546-5B08-56E9EDEF9A92}"/>
               </a:ext>
             </a:extLst>
           </p:cNvPr>
@@ -6244,26 +7548,55 @@
           <p:nvPr/>
         </p:nvPicPr>
         <p:blipFill>
-          <a:blip r:embed="rId2">
+          <a:blip r:embed="rId3">
             <a:extLst>
               <a:ext uri="{28A0092B-C50C-407E-A947-70E740481C1C}">
                 <a14:useLocalDpi xmlns:a14="http://schemas.microsoft.com/office/drawing/2010/main" val="0"/>
               </a:ext>
             </a:extLst>
           </a:blip>
-          <a:srcRect l="8828" t="15279" r="8516" b="14583"/>
+          <a:srcRect l="6393" t="11377" r="6993" b="14208"/>
           <a:stretch/>
         </p:blipFill>
         <p:spPr>
           <a:xfrm>
-            <a:off x="590550" y="1571625"/>
-            <a:ext cx="10676110" cy="5095875"/>
+            <a:off x="1404937" y="1533273"/>
+            <a:ext cx="9382125" cy="4534154"/>
           </a:xfrm>
           <a:prstGeom prst="rect">
             <a:avLst/>
           </a:prstGeom>
         </p:spPr>
       </p:pic>
+      <p:sp>
+        <p:nvSpPr>
+          <p:cNvPr id="9" name="Marcador de número de diapositiva 8">
+            <a:extLst>
+              <a:ext uri="{FF2B5EF4-FFF2-40B4-BE49-F238E27FC236}">
+                <a16:creationId xmlns:a16="http://schemas.microsoft.com/office/drawing/2014/main" id="{31AAD7D2-80C0-16F2-37B6-DAE392D24008}"/>
+              </a:ext>
+            </a:extLst>
+          </p:cNvPr>
+          <p:cNvSpPr>
+            <a:spLocks noGrp="1"/>
+          </p:cNvSpPr>
+          <p:nvPr>
+            <p:ph type="sldNum" sz="quarter" idx="12"/>
+          </p:nvPr>
+        </p:nvSpPr>
+        <p:spPr/>
+        <p:txBody>
+          <a:bodyPr/>
+          <a:lstStyle/>
+          <a:p>
+            <a:fld id="{A2E06AC6-F717-4067-8E7D-0419126E5B27}" type="slidenum">
+              <a:rPr lang="es-ES" smtClean="0"/>
+              <a:t>4</a:t>
+            </a:fld>
+            <a:endParaRPr lang="es-ES"/>
+          </a:p>
+        </p:txBody>
+      </p:sp>
     </p:spTree>
     <p:extLst>
       <p:ext uri="{BB962C8B-B14F-4D97-AF65-F5344CB8AC3E}">
@@ -27537,41 +28870,6 @@
           </a:p>
         </p:txBody>
       </p:sp>
-      <p:sp>
-        <p:nvSpPr>
-          <p:cNvPr id="3" name="CuadroTexto 2">
-            <a:extLst>
-              <a:ext uri="{FF2B5EF4-FFF2-40B4-BE49-F238E27FC236}">
-                <a16:creationId xmlns:a16="http://schemas.microsoft.com/office/drawing/2014/main" id="{03B036DE-44CE-1E0F-239B-69A0731DACE4}"/>
-              </a:ext>
-            </a:extLst>
-          </p:cNvPr>
-          <p:cNvSpPr txBox="1"/>
-          <p:nvPr/>
-        </p:nvSpPr>
-        <p:spPr>
-          <a:xfrm>
-            <a:off x="11440160" y="6410960"/>
-            <a:ext cx="528320" cy="369332"/>
-          </a:xfrm>
-          <a:prstGeom prst="rect">
-            <a:avLst/>
-          </a:prstGeom>
-          <a:noFill/>
-        </p:spPr>
-        <p:txBody>
-          <a:bodyPr wrap="square" rtlCol="0">
-            <a:spAutoFit/>
-          </a:bodyPr>
-          <a:lstStyle/>
-          <a:p>
-            <a:r>
-              <a:rPr lang="es-ES" dirty="0"/>
-              <a:t>5</a:t>
-            </a:r>
-          </a:p>
-        </p:txBody>
-      </p:sp>
       <p:pic>
         <p:nvPicPr>
           <p:cNvPr id="5" name="Imagen 4">
@@ -27632,6 +28930,35 @@
           </a:prstGeom>
         </p:spPr>
       </p:pic>
+      <p:sp>
+        <p:nvSpPr>
+          <p:cNvPr id="4" name="Marcador de número de diapositiva 3">
+            <a:extLst>
+              <a:ext uri="{FF2B5EF4-FFF2-40B4-BE49-F238E27FC236}">
+                <a16:creationId xmlns:a16="http://schemas.microsoft.com/office/drawing/2014/main" id="{C15D4B87-E9DF-7994-8F95-A0AA2F5112BB}"/>
+              </a:ext>
+            </a:extLst>
+          </p:cNvPr>
+          <p:cNvSpPr>
+            <a:spLocks noGrp="1"/>
+          </p:cNvSpPr>
+          <p:nvPr>
+            <p:ph type="sldNum" sz="quarter" idx="12"/>
+          </p:nvPr>
+        </p:nvSpPr>
+        <p:spPr/>
+        <p:txBody>
+          <a:bodyPr/>
+          <a:lstStyle/>
+          <a:p>
+            <a:fld id="{A2E06AC6-F717-4067-8E7D-0419126E5B27}" type="slidenum">
+              <a:rPr lang="es-ES" smtClean="0"/>
+              <a:t>5</a:t>
+            </a:fld>
+            <a:endParaRPr lang="es-ES"/>
+          </a:p>
+        </p:txBody>
+      </p:sp>
     </p:spTree>
     <p:extLst>
       <p:ext uri="{BB962C8B-B14F-4D97-AF65-F5344CB8AC3E}">
@@ -28053,10 +29380,10 @@
       </p:sp>
       <p:sp>
         <p:nvSpPr>
-          <p:cNvPr id="3" name="CuadroTexto 2">
+          <p:cNvPr id="11" name="CuadroTexto 10">
             <a:extLst>
               <a:ext uri="{FF2B5EF4-FFF2-40B4-BE49-F238E27FC236}">
-                <a16:creationId xmlns:a16="http://schemas.microsoft.com/office/drawing/2014/main" id="{E4F27A90-8FBA-1148-056B-E437AC795AEC}"/>
+                <a16:creationId xmlns:a16="http://schemas.microsoft.com/office/drawing/2014/main" id="{E0AB590C-6E1E-138F-D66A-3481C2660823}"/>
               </a:ext>
             </a:extLst>
           </p:cNvPr>
@@ -28065,8 +29392,8 @@
         </p:nvSpPr>
         <p:spPr>
           <a:xfrm>
-            <a:off x="11440160" y="6410960"/>
-            <a:ext cx="528320" cy="369332"/>
+            <a:off x="7450774" y="5368409"/>
+            <a:ext cx="1176518" cy="369332"/>
           </a:xfrm>
           <a:prstGeom prst="rect">
             <a:avLst/>
@@ -28081,73 +29408,84 @@
           <a:p>
             <a:r>
               <a:rPr lang="es-ES" dirty="0"/>
-              <a:t>6</a:t>
+              <a:t>HDC2010</a:t>
             </a:r>
           </a:p>
         </p:txBody>
       </p:sp>
       <p:pic>
         <p:nvPicPr>
-          <p:cNvPr id="5" name="Imagen 4">
+          <p:cNvPr id="1026" name="Picture 2" descr="HDC2010 - Low Power Humidity and Temperature Sensor - Electronics-Lab.com">
             <a:extLst>
               <a:ext uri="{FF2B5EF4-FFF2-40B4-BE49-F238E27FC236}">
-                <a16:creationId xmlns:a16="http://schemas.microsoft.com/office/drawing/2014/main" id="{62D17520-9936-DA3B-6866-50B243927836}"/>
+                <a16:creationId xmlns:a16="http://schemas.microsoft.com/office/drawing/2014/main" id="{52C961ED-A9AD-4BDA-BF2C-DC8061A5BCE0}"/>
               </a:ext>
             </a:extLst>
           </p:cNvPr>
           <p:cNvPicPr>
-            <a:picLocks noChangeAspect="1"/>
+            <a:picLocks noChangeAspect="1" noChangeArrowheads="1"/>
           </p:cNvPicPr>
           <p:nvPr/>
         </p:nvPicPr>
         <p:blipFill>
-          <a:blip r:embed="rId2"/>
+          <a:blip r:embed="rId2">
+            <a:extLst>
+              <a:ext uri="{28A0092B-C50C-407E-A947-70E740481C1C}">
+                <a14:useLocalDpi xmlns:a14="http://schemas.microsoft.com/office/drawing/2010/main" val="0"/>
+              </a:ext>
+            </a:extLst>
+          </a:blip>
+          <a:srcRect/>
           <a:stretch>
             <a:fillRect/>
           </a:stretch>
         </p:blipFill>
-        <p:spPr>
+        <p:spPr bwMode="auto">
           <a:xfrm>
-            <a:off x="5510193" y="620022"/>
-            <a:ext cx="5566872" cy="4906526"/>
-          </a:xfrm>
-          <a:prstGeom prst="rect">
-            <a:avLst/>
-          </a:prstGeom>
-        </p:spPr>
-      </p:pic>
-      <p:sp>
-        <p:nvSpPr>
-          <p:cNvPr id="11" name="CuadroTexto 10">
-            <a:extLst>
-              <a:ext uri="{FF2B5EF4-FFF2-40B4-BE49-F238E27FC236}">
-                <a16:creationId xmlns:a16="http://schemas.microsoft.com/office/drawing/2014/main" id="{E0AB590C-6E1E-138F-D66A-3481C2660823}"/>
-              </a:ext>
-            </a:extLst>
-          </p:cNvPr>
-          <p:cNvSpPr txBox="1"/>
-          <p:nvPr/>
-        </p:nvSpPr>
-        <p:spPr>
-          <a:xfrm>
-            <a:off x="7881757" y="5777238"/>
-            <a:ext cx="1078992" cy="369332"/>
+            <a:off x="4452655" y="1304925"/>
+            <a:ext cx="7172757" cy="4016744"/>
           </a:xfrm>
           <a:prstGeom prst="rect">
             <a:avLst/>
           </a:prstGeom>
           <a:noFill/>
+          <a:extLst>
+            <a:ext uri="{909E8E84-426E-40DD-AFC4-6F175D3DCCD1}">
+              <a14:hiddenFill xmlns:a14="http://schemas.microsoft.com/office/drawing/2010/main">
+                <a:solidFill>
+                  <a:srgbClr val="FFFFFF"/>
+                </a:solidFill>
+              </a14:hiddenFill>
+            </a:ext>
+          </a:extLst>
         </p:spPr>
+      </p:pic>
+      <p:sp>
+        <p:nvSpPr>
+          <p:cNvPr id="4" name="Marcador de número de diapositiva 3">
+            <a:extLst>
+              <a:ext uri="{FF2B5EF4-FFF2-40B4-BE49-F238E27FC236}">
+                <a16:creationId xmlns:a16="http://schemas.microsoft.com/office/drawing/2014/main" id="{BF3A1D5B-03F8-0A87-EC14-77FD8A834875}"/>
+              </a:ext>
+            </a:extLst>
+          </p:cNvPr>
+          <p:cNvSpPr>
+            <a:spLocks noGrp="1"/>
+          </p:cNvSpPr>
+          <p:nvPr>
+            <p:ph type="sldNum" sz="quarter" idx="12"/>
+          </p:nvPr>
+        </p:nvSpPr>
+        <p:spPr/>
         <p:txBody>
-          <a:bodyPr wrap="square" rtlCol="0">
-            <a:spAutoFit/>
-          </a:bodyPr>
+          <a:bodyPr/>
           <a:lstStyle/>
           <a:p>
-            <a:r>
-              <a:rPr lang="es-ES" dirty="0"/>
-              <a:t>HIH6130</a:t>
-            </a:r>
+            <a:fld id="{A2E06AC6-F717-4067-8E7D-0419126E5B27}" type="slidenum">
+              <a:rPr lang="es-ES" smtClean="0"/>
+              <a:t>6</a:t>
+            </a:fld>
+            <a:endParaRPr lang="es-ES"/>
           </a:p>
         </p:txBody>
       </p:sp>
@@ -28954,36 +30292,30 @@
       </p:pic>
       <p:sp>
         <p:nvSpPr>
-          <p:cNvPr id="3" name="CuadroTexto 2">
+          <p:cNvPr id="5" name="Marcador de número de diapositiva 4">
             <a:extLst>
               <a:ext uri="{FF2B5EF4-FFF2-40B4-BE49-F238E27FC236}">
-                <a16:creationId xmlns:a16="http://schemas.microsoft.com/office/drawing/2014/main" id="{3CEE1313-2CE7-3561-F25E-4323B756A8A9}"/>
+                <a16:creationId xmlns:a16="http://schemas.microsoft.com/office/drawing/2014/main" id="{A72D9915-F14C-92BA-34B9-5FCEB58D9437}"/>
               </a:ext>
             </a:extLst>
           </p:cNvPr>
-          <p:cNvSpPr txBox="1"/>
-          <p:nvPr/>
+          <p:cNvSpPr>
+            <a:spLocks noGrp="1"/>
+          </p:cNvSpPr>
+          <p:nvPr>
+            <p:ph type="sldNum" sz="quarter" idx="12"/>
+          </p:nvPr>
         </p:nvSpPr>
-        <p:spPr>
-          <a:xfrm>
-            <a:off x="11440160" y="6410960"/>
-            <a:ext cx="528320" cy="369332"/>
-          </a:xfrm>
-          <a:prstGeom prst="rect">
-            <a:avLst/>
-          </a:prstGeom>
-          <a:noFill/>
-        </p:spPr>
+        <p:spPr/>
         <p:txBody>
-          <a:bodyPr wrap="square" rtlCol="0">
-            <a:spAutoFit/>
-          </a:bodyPr>
+          <a:bodyPr/>
           <a:lstStyle/>
           <a:p>
-            <a:r>
-              <a:rPr lang="es-ES" dirty="0"/>
+            <a:fld id="{A2E06AC6-F717-4067-8E7D-0419126E5B27}" type="slidenum">
+              <a:rPr lang="es-ES" smtClean="0"/>
               <a:t>7</a:t>
-            </a:r>
+            </a:fld>
+            <a:endParaRPr lang="es-ES"/>
           </a:p>
         </p:txBody>
       </p:sp>
@@ -29624,36 +30956,30 @@
       </p:sp>
       <p:sp>
         <p:nvSpPr>
-          <p:cNvPr id="3" name="CuadroTexto 2">
+          <p:cNvPr id="4" name="Marcador de número de diapositiva 3">
             <a:extLst>
               <a:ext uri="{FF2B5EF4-FFF2-40B4-BE49-F238E27FC236}">
-                <a16:creationId xmlns:a16="http://schemas.microsoft.com/office/drawing/2014/main" id="{08BECFBF-1FFF-70DA-985C-A8C08C7FF4EF}"/>
+                <a16:creationId xmlns:a16="http://schemas.microsoft.com/office/drawing/2014/main" id="{9F1DF2EE-22DD-35CA-6214-3EC668C26C6B}"/>
               </a:ext>
             </a:extLst>
           </p:cNvPr>
-          <p:cNvSpPr txBox="1"/>
-          <p:nvPr/>
+          <p:cNvSpPr>
+            <a:spLocks noGrp="1"/>
+          </p:cNvSpPr>
+          <p:nvPr>
+            <p:ph type="sldNum" sz="quarter" idx="12"/>
+          </p:nvPr>
         </p:nvSpPr>
-        <p:spPr>
-          <a:xfrm>
-            <a:off x="11440160" y="6410960"/>
-            <a:ext cx="528320" cy="369332"/>
-          </a:xfrm>
-          <a:prstGeom prst="rect">
-            <a:avLst/>
-          </a:prstGeom>
-          <a:noFill/>
-        </p:spPr>
+        <p:spPr/>
         <p:txBody>
-          <a:bodyPr wrap="square" rtlCol="0">
-            <a:spAutoFit/>
-          </a:bodyPr>
+          <a:bodyPr/>
           <a:lstStyle/>
           <a:p>
-            <a:r>
-              <a:rPr lang="es-ES" dirty="0"/>
+            <a:fld id="{A2E06AC6-F717-4067-8E7D-0419126E5B27}" type="slidenum">
+              <a:rPr lang="es-ES" smtClean="0"/>
               <a:t>8</a:t>
-            </a:r>
+            </a:fld>
+            <a:endParaRPr lang="es-ES"/>
           </a:p>
         </p:txBody>
       </p:sp>
@@ -30383,36 +31709,30 @@
       </p:sp>
       <p:sp>
         <p:nvSpPr>
-          <p:cNvPr id="10" name="CuadroTexto 9">
+          <p:cNvPr id="2" name="Marcador de número de diapositiva 1">
             <a:extLst>
               <a:ext uri="{FF2B5EF4-FFF2-40B4-BE49-F238E27FC236}">
-                <a16:creationId xmlns:a16="http://schemas.microsoft.com/office/drawing/2014/main" id="{D10E40FA-032D-B2D9-F20B-F84D16EE4F79}"/>
+                <a16:creationId xmlns:a16="http://schemas.microsoft.com/office/drawing/2014/main" id="{A8EBBFD2-52EC-7B4A-D3E7-C483CA5063F1}"/>
               </a:ext>
             </a:extLst>
           </p:cNvPr>
-          <p:cNvSpPr txBox="1"/>
-          <p:nvPr/>
+          <p:cNvSpPr>
+            <a:spLocks noGrp="1"/>
+          </p:cNvSpPr>
+          <p:nvPr>
+            <p:ph type="sldNum" sz="quarter" idx="12"/>
+          </p:nvPr>
         </p:nvSpPr>
-        <p:spPr>
-          <a:xfrm>
-            <a:off x="11440160" y="6410960"/>
-            <a:ext cx="528320" cy="369332"/>
-          </a:xfrm>
-          <a:prstGeom prst="rect">
-            <a:avLst/>
-          </a:prstGeom>
-          <a:noFill/>
-        </p:spPr>
+        <p:spPr/>
         <p:txBody>
-          <a:bodyPr wrap="square" rtlCol="0">
-            <a:spAutoFit/>
-          </a:bodyPr>
+          <a:bodyPr/>
           <a:lstStyle/>
           <a:p>
-            <a:r>
-              <a:rPr lang="es-ES" dirty="0"/>
+            <a:fld id="{A2E06AC6-F717-4067-8E7D-0419126E5B27}" type="slidenum">
+              <a:rPr lang="es-ES" smtClean="0"/>
               <a:t>9</a:t>
-            </a:r>
+            </a:fld>
+            <a:endParaRPr lang="es-ES"/>
           </a:p>
         </p:txBody>
       </p:sp>
@@ -31372,4 +32692,219 @@
     </a:ext>
   </a:extLst>
 </a:theme>
+</file>
+
+<file path=customXml/item1.xml><?xml version="1.0" encoding="utf-8"?>
+<ct:contentTypeSchema xmlns:ct="http://schemas.microsoft.com/office/2006/metadata/contentType" xmlns:ma="http://schemas.microsoft.com/office/2006/metadata/properties/metaAttributes" ct:_="" ma:_="" ma:contentTypeName="Documento" ma:contentTypeID="0x0101007B2BC552F8935D439DA4C97B8EDF327E" ma:contentTypeVersion="6" ma:contentTypeDescription="Crear nuevo documento." ma:contentTypeScope="" ma:versionID="95b740eadd4cf3079cb70c68d805db7d">
+  <xsd:schema xmlns:xsd="http://www.w3.org/2001/XMLSchema" xmlns:xs="http://www.w3.org/2001/XMLSchema" xmlns:p="http://schemas.microsoft.com/office/2006/metadata/properties" xmlns:ns3="7a2fa7b8-237b-4936-8d0e-f4f61d3514b7" targetNamespace="http://schemas.microsoft.com/office/2006/metadata/properties" ma:root="true" ma:fieldsID="a22367eb10b7191be46c797c78a70cf3" ns3:_="">
+    <xsd:import namespace="7a2fa7b8-237b-4936-8d0e-f4f61d3514b7"/>
+    <xsd:element name="properties">
+      <xsd:complexType>
+        <xsd:sequence>
+          <xsd:element name="documentManagement">
+            <xsd:complexType>
+              <xsd:all>
+                <xsd:element ref="ns3:MediaServiceDateTaken" minOccurs="0"/>
+                <xsd:element ref="ns3:MediaServiceMetadata" minOccurs="0"/>
+                <xsd:element ref="ns3:MediaServiceFastMetadata" minOccurs="0"/>
+                <xsd:element ref="ns3:MediaServiceSearchProperties" minOccurs="0"/>
+                <xsd:element ref="ns3:MediaServiceObjectDetectorVersions" minOccurs="0"/>
+                <xsd:element ref="ns3:_activity" minOccurs="0"/>
+              </xsd:all>
+            </xsd:complexType>
+          </xsd:element>
+        </xsd:sequence>
+      </xsd:complexType>
+    </xsd:element>
+  </xsd:schema>
+  <xsd:schema xmlns:xsd="http://www.w3.org/2001/XMLSchema" xmlns:xs="http://www.w3.org/2001/XMLSchema" xmlns:dms="http://schemas.microsoft.com/office/2006/documentManagement/types" xmlns:pc="http://schemas.microsoft.com/office/infopath/2007/PartnerControls" targetNamespace="7a2fa7b8-237b-4936-8d0e-f4f61d3514b7" elementFormDefault="qualified">
+    <xsd:import namespace="http://schemas.microsoft.com/office/2006/documentManagement/types"/>
+    <xsd:import namespace="http://schemas.microsoft.com/office/infopath/2007/PartnerControls"/>
+    <xsd:element name="MediaServiceDateTaken" ma:index="8" nillable="true" ma:displayName="MediaServiceDateTaken" ma:hidden="true" ma:indexed="true" ma:internalName="MediaServiceDateTaken" ma:readOnly="true">
+      <xsd:simpleType>
+        <xsd:restriction base="dms:Text"/>
+      </xsd:simpleType>
+    </xsd:element>
+    <xsd:element name="MediaServiceMetadata" ma:index="9" nillable="true" ma:displayName="MediaServiceMetadata" ma:hidden="true" ma:internalName="MediaServiceMetadata" ma:readOnly="true">
+      <xsd:simpleType>
+        <xsd:restriction base="dms:Note"/>
+      </xsd:simpleType>
+    </xsd:element>
+    <xsd:element name="MediaServiceFastMetadata" ma:index="10" nillable="true" ma:displayName="MediaServiceFastMetadata" ma:hidden="true" ma:internalName="MediaServiceFastMetadata" ma:readOnly="true">
+      <xsd:simpleType>
+        <xsd:restriction base="dms:Note"/>
+      </xsd:simpleType>
+    </xsd:element>
+    <xsd:element name="MediaServiceSearchProperties" ma:index="11" nillable="true" ma:displayName="MediaServiceSearchProperties" ma:hidden="true" ma:internalName="MediaServiceSearchProperties" ma:readOnly="true">
+      <xsd:simpleType>
+        <xsd:restriction base="dms:Note"/>
+      </xsd:simpleType>
+    </xsd:element>
+    <xsd:element name="MediaServiceObjectDetectorVersions" ma:index="12" nillable="true" ma:displayName="MediaServiceObjectDetectorVersions" ma:hidden="true" ma:indexed="true" ma:internalName="MediaServiceObjectDetectorVersions" ma:readOnly="true">
+      <xsd:simpleType>
+        <xsd:restriction base="dms:Text"/>
+      </xsd:simpleType>
+    </xsd:element>
+    <xsd:element name="_activity" ma:index="13" nillable="true" ma:displayName="_activity" ma:hidden="true" ma:internalName="_activity">
+      <xsd:simpleType>
+        <xsd:restriction base="dms:Note"/>
+      </xsd:simpleType>
+    </xsd:element>
+  </xsd:schema>
+  <xsd:schema xmlns="http://schemas.openxmlformats.org/package/2006/metadata/core-properties" xmlns:xsd="http://www.w3.org/2001/XMLSchema" xmlns:xsi="http://www.w3.org/2001/XMLSchema-instance" xmlns:dc="http://purl.org/dc/elements/1.1/" xmlns:dcterms="http://purl.org/dc/terms/" xmlns:odoc="http://schemas.microsoft.com/internal/obd" targetNamespace="http://schemas.openxmlformats.org/package/2006/metadata/core-properties" elementFormDefault="qualified" attributeFormDefault="unqualified" blockDefault="#all">
+    <xsd:import namespace="http://purl.org/dc/elements/1.1/" schemaLocation="http://dublincore.org/schemas/xmls/qdc/2003/04/02/dc.xsd"/>
+    <xsd:import namespace="http://purl.org/dc/terms/" schemaLocation="http://dublincore.org/schemas/xmls/qdc/2003/04/02/dcterms.xsd"/>
+    <xsd:element name="coreProperties" type="CT_coreProperties"/>
+    <xsd:complexType name="CT_coreProperties">
+      <xsd:all>
+        <xsd:element ref="dc:creator" minOccurs="0" maxOccurs="1"/>
+        <xsd:element ref="dcterms:created" minOccurs="0" maxOccurs="1"/>
+        <xsd:element ref="dc:identifier" minOccurs="0" maxOccurs="1"/>
+        <xsd:element name="contentType" minOccurs="0" maxOccurs="1" type="xsd:string" ma:index="0" ma:displayName="Tipo de contenido"/>
+        <xsd:element ref="dc:title" minOccurs="0" maxOccurs="1" ma:index="4" ma:displayName="Título"/>
+        <xsd:element ref="dc:subject" minOccurs="0" maxOccurs="1"/>
+        <xsd:element ref="dc:description" minOccurs="0" maxOccurs="1"/>
+        <xsd:element name="keywords" minOccurs="0" maxOccurs="1" type="xsd:string"/>
+        <xsd:element ref="dc:language" minOccurs="0" maxOccurs="1"/>
+        <xsd:element name="category" minOccurs="0" maxOccurs="1" type="xsd:string"/>
+        <xsd:element name="version" minOccurs="0" maxOccurs="1" type="xsd:string"/>
+        <xsd:element name="revision" minOccurs="0" maxOccurs="1" type="xsd:string">
+          <xsd:annotation>
+            <xsd:documentation>
+                        This value indicates the number of saves or revisions. The application is responsible for updating this value after each revision.
+                    </xsd:documentation>
+          </xsd:annotation>
+        </xsd:element>
+        <xsd:element name="lastModifiedBy" minOccurs="0" maxOccurs="1" type="xsd:string"/>
+        <xsd:element ref="dcterms:modified" minOccurs="0" maxOccurs="1"/>
+        <xsd:element name="contentStatus" minOccurs="0" maxOccurs="1" type="xsd:string"/>
+      </xsd:all>
+    </xsd:complexType>
+  </xsd:schema>
+  <xs:schema xmlns:pc="http://schemas.microsoft.com/office/infopath/2007/PartnerControls" xmlns:xs="http://www.w3.org/2001/XMLSchema" targetNamespace="http://schemas.microsoft.com/office/infopath/2007/PartnerControls" elementFormDefault="qualified" attributeFormDefault="unqualified">
+    <xs:element name="Person">
+      <xs:complexType>
+        <xs:sequence>
+          <xs:element ref="pc:DisplayName" minOccurs="0"/>
+          <xs:element ref="pc:AccountId" minOccurs="0"/>
+          <xs:element ref="pc:AccountType" minOccurs="0"/>
+        </xs:sequence>
+      </xs:complexType>
+    </xs:element>
+    <xs:element name="DisplayName" type="xs:string"/>
+    <xs:element name="AccountId" type="xs:string"/>
+    <xs:element name="AccountType" type="xs:string"/>
+    <xs:element name="BDCAssociatedEntity">
+      <xs:complexType>
+        <xs:sequence>
+          <xs:element ref="pc:BDCEntity" minOccurs="0" maxOccurs="unbounded"/>
+        </xs:sequence>
+        <xs:attribute ref="pc:EntityNamespace"/>
+        <xs:attribute ref="pc:EntityName"/>
+        <xs:attribute ref="pc:SystemInstanceName"/>
+        <xs:attribute ref="pc:AssociationName"/>
+      </xs:complexType>
+    </xs:element>
+    <xs:attribute name="EntityNamespace" type="xs:string"/>
+    <xs:attribute name="EntityName" type="xs:string"/>
+    <xs:attribute name="SystemInstanceName" type="xs:string"/>
+    <xs:attribute name="AssociationName" type="xs:string"/>
+    <xs:element name="BDCEntity">
+      <xs:complexType>
+        <xs:sequence>
+          <xs:element ref="pc:EntityDisplayName" minOccurs="0"/>
+          <xs:element ref="pc:EntityInstanceReference" minOccurs="0"/>
+          <xs:element ref="pc:EntityId1" minOccurs="0"/>
+          <xs:element ref="pc:EntityId2" minOccurs="0"/>
+          <xs:element ref="pc:EntityId3" minOccurs="0"/>
+          <xs:element ref="pc:EntityId4" minOccurs="0"/>
+          <xs:element ref="pc:EntityId5" minOccurs="0"/>
+        </xs:sequence>
+      </xs:complexType>
+    </xs:element>
+    <xs:element name="EntityDisplayName" type="xs:string"/>
+    <xs:element name="EntityInstanceReference" type="xs:string"/>
+    <xs:element name="EntityId1" type="xs:string"/>
+    <xs:element name="EntityId2" type="xs:string"/>
+    <xs:element name="EntityId3" type="xs:string"/>
+    <xs:element name="EntityId4" type="xs:string"/>
+    <xs:element name="EntityId5" type="xs:string"/>
+    <xs:element name="Terms">
+      <xs:complexType>
+        <xs:sequence>
+          <xs:element ref="pc:TermInfo" minOccurs="0" maxOccurs="unbounded"/>
+        </xs:sequence>
+      </xs:complexType>
+    </xs:element>
+    <xs:element name="TermInfo">
+      <xs:complexType>
+        <xs:sequence>
+          <xs:element ref="pc:TermName" minOccurs="0"/>
+          <xs:element ref="pc:TermId" minOccurs="0"/>
+        </xs:sequence>
+      </xs:complexType>
+    </xs:element>
+    <xs:element name="TermName" type="xs:string"/>
+    <xs:element name="TermId" type="xs:string"/>
+  </xs:schema>
+</ct:contentTypeSchema>
+</file>
+
+<file path=customXml/item2.xml><?xml version="1.0" encoding="utf-8"?>
+<?mso-contentType ?>
+<FormTemplates xmlns="http://schemas.microsoft.com/sharepoint/v3/contenttype/forms">
+  <Display>DocumentLibraryForm</Display>
+  <Edit>DocumentLibraryForm</Edit>
+  <New>DocumentLibraryForm</New>
+</FormTemplates>
+</file>
+
+<file path=customXml/item3.xml><?xml version="1.0" encoding="utf-8"?>
+<p:properties xmlns:p="http://schemas.microsoft.com/office/2006/metadata/properties" xmlns:xsi="http://www.w3.org/2001/XMLSchema-instance" xmlns:pc="http://schemas.microsoft.com/office/infopath/2007/PartnerControls">
+  <documentManagement>
+    <_activity xmlns="7a2fa7b8-237b-4936-8d0e-f4f61d3514b7" xsi:nil="true"/>
+  </documentManagement>
+</p:properties>
+</file>
+
+<file path=customXml/itemProps1.xml><?xml version="1.0" encoding="utf-8"?>
+<ds:datastoreItem xmlns:ds="http://schemas.openxmlformats.org/officeDocument/2006/customXml" ds:itemID="{0E711DE7-A887-48A7-9897-5ABB20DD7607}">
+  <ds:schemaRefs>
+    <ds:schemaRef ds:uri="http://schemas.microsoft.com/office/2006/metadata/contentType"/>
+    <ds:schemaRef ds:uri="http://schemas.microsoft.com/office/2006/metadata/properties/metaAttributes"/>
+    <ds:schemaRef ds:uri="http://www.w3.org/2001/XMLSchema"/>
+    <ds:schemaRef ds:uri="http://schemas.microsoft.com/office/2006/metadata/properties"/>
+    <ds:schemaRef ds:uri="7a2fa7b8-237b-4936-8d0e-f4f61d3514b7"/>
+    <ds:schemaRef ds:uri="http://schemas.microsoft.com/office/2006/documentManagement/types"/>
+    <ds:schemaRef ds:uri="http://schemas.microsoft.com/office/infopath/2007/PartnerControls"/>
+    <ds:schemaRef ds:uri="http://schemas.openxmlformats.org/package/2006/metadata/core-properties"/>
+    <ds:schemaRef ds:uri="http://purl.org/dc/elements/1.1/"/>
+    <ds:schemaRef ds:uri="http://purl.org/dc/terms/"/>
+    <ds:schemaRef ds:uri="http://schemas.microsoft.com/internal/obd"/>
+  </ds:schemaRefs>
+</ds:datastoreItem>
+</file>
+
+<file path=customXml/itemProps2.xml><?xml version="1.0" encoding="utf-8"?>
+<ds:datastoreItem xmlns:ds="http://schemas.openxmlformats.org/officeDocument/2006/customXml" ds:itemID="{D5EADC3D-951F-4256-B5AC-93ABBABE267B}">
+  <ds:schemaRefs>
+    <ds:schemaRef ds:uri="http://schemas.microsoft.com/sharepoint/v3/contenttype/forms"/>
+  </ds:schemaRefs>
+</ds:datastoreItem>
+</file>
+
+<file path=customXml/itemProps3.xml><?xml version="1.0" encoding="utf-8"?>
+<ds:datastoreItem xmlns:ds="http://schemas.openxmlformats.org/officeDocument/2006/customXml" ds:itemID="{174FCED6-D4FE-4578-8A37-BFC7B51586D6}">
+  <ds:schemaRefs>
+    <ds:schemaRef ds:uri="http://purl.org/dc/dcmitype/"/>
+    <ds:schemaRef ds:uri="http://www.w3.org/XML/1998/namespace"/>
+    <ds:schemaRef ds:uri="http://purl.org/dc/elements/1.1/"/>
+    <ds:schemaRef ds:uri="http://purl.org/dc/terms/"/>
+    <ds:schemaRef ds:uri="http://schemas.microsoft.com/office/infopath/2007/PartnerControls"/>
+    <ds:schemaRef ds:uri="http://schemas.microsoft.com/office/2006/documentManagement/types"/>
+    <ds:schemaRef ds:uri="7a2fa7b8-237b-4936-8d0e-f4f61d3514b7"/>
+    <ds:schemaRef ds:uri="http://schemas.openxmlformats.org/package/2006/metadata/core-properties"/>
+    <ds:schemaRef ds:uri="http://schemas.microsoft.com/office/2006/metadata/properties"/>
+  </ds:schemaRefs>
+</ds:datastoreItem>
 </file>
</xml_diff>

<commit_message>
cambio de diagrama de bloques
</commit_message>
<xml_diff>
--- a/Documentos/Presentaciones/Presentación del Proyecto.pptx
+++ b/Documentos/Presentaciones/Presentación del Proyecto.pptx
@@ -228,7 +228,7 @@
           <a:p>
             <a:fld id="{51BCAC93-7060-47A6-8C73-BF49BF292F85}" type="datetimeFigureOut">
               <a:rPr lang="es-ES" smtClean="0"/>
-              <a:t>02/04/2025</a:t>
+              <a:t>07/04/2025</a:t>
             </a:fld>
             <a:endParaRPr lang="es-ES"/>
           </a:p>
@@ -406,7 +406,7 @@
           <a:p>
             <a:fld id="{A45B1386-48DD-4315-9E6B-F140ABA5AC5B}" type="datetimeFigureOut">
               <a:rPr lang="es-ES" smtClean="0"/>
-              <a:t>02/04/2025</a:t>
+              <a:t>07/04/2025</a:t>
             </a:fld>
             <a:endParaRPr lang="es-ES"/>
           </a:p>
@@ -905,7 +905,7 @@
           <a:p>
             <a:fld id="{C132170E-547A-4460-A15D-1C10C4C1E4F4}" type="datetime1">
               <a:rPr lang="es-ES" smtClean="0"/>
-              <a:t>02/04/2025</a:t>
+              <a:t>07/04/2025</a:t>
             </a:fld>
             <a:endParaRPr lang="es-ES"/>
           </a:p>
@@ -1103,7 +1103,7 @@
           <a:p>
             <a:fld id="{3FF4DC2C-78D1-4FFB-BAF2-BA41252B3A8D}" type="datetime1">
               <a:rPr lang="es-ES" smtClean="0"/>
-              <a:t>02/04/2025</a:t>
+              <a:t>07/04/2025</a:t>
             </a:fld>
             <a:endParaRPr lang="es-ES"/>
           </a:p>
@@ -1311,7 +1311,7 @@
           <a:p>
             <a:fld id="{85C31C29-86E7-4B63-B456-A6ABB6459D54}" type="datetime1">
               <a:rPr lang="es-ES" smtClean="0"/>
-              <a:t>02/04/2025</a:t>
+              <a:t>07/04/2025</a:t>
             </a:fld>
             <a:endParaRPr lang="es-ES"/>
           </a:p>
@@ -1509,7 +1509,7 @@
           <a:p>
             <a:fld id="{AF7948F7-4188-4DDE-8E10-7E648C8F6285}" type="datetime1">
               <a:rPr lang="es-ES" smtClean="0"/>
-              <a:t>02/04/2025</a:t>
+              <a:t>07/04/2025</a:t>
             </a:fld>
             <a:endParaRPr lang="es-ES"/>
           </a:p>
@@ -1784,7 +1784,7 @@
           <a:p>
             <a:fld id="{45B4E5D2-FB7D-47AE-BB7B-CCEDFAA937DE}" type="datetime1">
               <a:rPr lang="es-ES" smtClean="0"/>
-              <a:t>02/04/2025</a:t>
+              <a:t>07/04/2025</a:t>
             </a:fld>
             <a:endParaRPr lang="es-ES"/>
           </a:p>
@@ -2049,7 +2049,7 @@
           <a:p>
             <a:fld id="{5169BBBF-8397-42D0-97DC-B50A5308270B}" type="datetime1">
               <a:rPr lang="es-ES" smtClean="0"/>
-              <a:t>02/04/2025</a:t>
+              <a:t>07/04/2025</a:t>
             </a:fld>
             <a:endParaRPr lang="es-ES"/>
           </a:p>
@@ -2461,7 +2461,7 @@
           <a:p>
             <a:fld id="{AFEC1565-3E0D-4A5B-9F95-C715B0079CD4}" type="datetime1">
               <a:rPr lang="es-ES" smtClean="0"/>
-              <a:t>02/04/2025</a:t>
+              <a:t>07/04/2025</a:t>
             </a:fld>
             <a:endParaRPr lang="es-ES"/>
           </a:p>
@@ -2602,7 +2602,7 @@
           <a:p>
             <a:fld id="{74818B9A-9328-400F-B79F-4F2E059ECD27}" type="datetime1">
               <a:rPr lang="es-ES" smtClean="0"/>
-              <a:t>02/04/2025</a:t>
+              <a:t>07/04/2025</a:t>
             </a:fld>
             <a:endParaRPr lang="es-ES"/>
           </a:p>
@@ -2715,7 +2715,7 @@
           <a:p>
             <a:fld id="{4C73E90F-D9A2-4770-AC5B-B1E3E5445AB8}" type="datetime1">
               <a:rPr lang="es-ES" smtClean="0"/>
-              <a:t>02/04/2025</a:t>
+              <a:t>07/04/2025</a:t>
             </a:fld>
             <a:endParaRPr lang="es-ES"/>
           </a:p>
@@ -3026,7 +3026,7 @@
           <a:p>
             <a:fld id="{260AFA94-EF25-440C-B337-00E9F968541E}" type="datetime1">
               <a:rPr lang="es-ES" smtClean="0"/>
-              <a:t>02/04/2025</a:t>
+              <a:t>07/04/2025</a:t>
             </a:fld>
             <a:endParaRPr lang="es-ES"/>
           </a:p>
@@ -3314,7 +3314,7 @@
           <a:p>
             <a:fld id="{807B0780-8930-402B-9FF0-242D5A192479}" type="datetime1">
               <a:rPr lang="es-ES" smtClean="0"/>
-              <a:t>02/04/2025</a:t>
+              <a:t>07/04/2025</a:t>
             </a:fld>
             <a:endParaRPr lang="es-ES"/>
           </a:p>
@@ -3555,7 +3555,7 @@
           <a:p>
             <a:fld id="{B0AE733E-5559-4DFC-8A80-6FF4354DA9AB}" type="datetime1">
               <a:rPr lang="es-ES" smtClean="0"/>
-              <a:t>02/04/2025</a:t>
+              <a:t>07/04/2025</a:t>
             </a:fld>
             <a:endParaRPr lang="es-ES"/>
           </a:p>
@@ -7516,41 +7516,6 @@
           </a:p>
         </p:txBody>
       </p:sp>
-      <p:pic>
-        <p:nvPicPr>
-          <p:cNvPr id="8" name="Imagen 7" descr="Diagrama&#10;&#10;El contenido generado por IA puede ser incorrecto.">
-            <a:extLst>
-              <a:ext uri="{FF2B5EF4-FFF2-40B4-BE49-F238E27FC236}">
-                <a16:creationId xmlns:a16="http://schemas.microsoft.com/office/drawing/2014/main" id="{139079BD-65A1-7546-5B08-56E9EDEF9A92}"/>
-              </a:ext>
-            </a:extLst>
-          </p:cNvPr>
-          <p:cNvPicPr>
-            <a:picLocks noChangeAspect="1"/>
-          </p:cNvPicPr>
-          <p:nvPr/>
-        </p:nvPicPr>
-        <p:blipFill>
-          <a:blip r:embed="rId3">
-            <a:extLst>
-              <a:ext uri="{28A0092B-C50C-407E-A947-70E740481C1C}">
-                <a14:useLocalDpi xmlns:a14="http://schemas.microsoft.com/office/drawing/2010/main" val="0"/>
-              </a:ext>
-            </a:extLst>
-          </a:blip>
-          <a:srcRect l="6393" t="11377" r="6993" b="14208"/>
-          <a:stretch/>
-        </p:blipFill>
-        <p:spPr>
-          <a:xfrm>
-            <a:off x="1404937" y="1533273"/>
-            <a:ext cx="9382125" cy="4534154"/>
-          </a:xfrm>
-          <a:prstGeom prst="rect">
-            <a:avLst/>
-          </a:prstGeom>
-        </p:spPr>
-      </p:pic>
       <p:sp>
         <p:nvSpPr>
           <p:cNvPr id="9" name="Marcador de número de diapositiva 8">
@@ -7580,6 +7545,41 @@
           </a:p>
         </p:txBody>
       </p:sp>
+      <p:pic>
+        <p:nvPicPr>
+          <p:cNvPr id="4" name="Imagen 3" descr="Diagrama&#10;&#10;El contenido generado por IA puede ser incorrecto.">
+            <a:extLst>
+              <a:ext uri="{FF2B5EF4-FFF2-40B4-BE49-F238E27FC236}">
+                <a16:creationId xmlns:a16="http://schemas.microsoft.com/office/drawing/2014/main" id="{9C325DF0-9445-D39E-8335-4F9266CD2D6C}"/>
+              </a:ext>
+            </a:extLst>
+          </p:cNvPr>
+          <p:cNvPicPr>
+            <a:picLocks noChangeAspect="1"/>
+          </p:cNvPicPr>
+          <p:nvPr/>
+        </p:nvPicPr>
+        <p:blipFill>
+          <a:blip r:embed="rId3">
+            <a:extLst>
+              <a:ext uri="{28A0092B-C50C-407E-A947-70E740481C1C}">
+                <a14:useLocalDpi xmlns:a14="http://schemas.microsoft.com/office/drawing/2010/main" val="0"/>
+              </a:ext>
+            </a:extLst>
+          </a:blip>
+          <a:srcRect l="5246" t="14311" r="2661" b="11821"/>
+          <a:stretch/>
+        </p:blipFill>
+        <p:spPr>
+          <a:xfrm>
+            <a:off x="942975" y="1514475"/>
+            <a:ext cx="10731618" cy="4841875"/>
+          </a:xfrm>
+          <a:prstGeom prst="rect">
+            <a:avLst/>
+          </a:prstGeom>
+        </p:spPr>
+      </p:pic>
     </p:spTree>
     <p:extLst>
       <p:ext uri="{BB962C8B-B14F-4D97-AF65-F5344CB8AC3E}">
@@ -32678,6 +32678,15 @@
 </file>
 
 <file path=customXml/item1.xml><?xml version="1.0" encoding="utf-8"?>
+<?mso-contentType ?>
+<FormTemplates xmlns="http://schemas.microsoft.com/sharepoint/v3/contenttype/forms">
+  <Display>DocumentLibraryForm</Display>
+  <Edit>DocumentLibraryForm</Edit>
+  <New>DocumentLibraryForm</New>
+</FormTemplates>
+</file>
+
+<file path=customXml/item2.xml><?xml version="1.0" encoding="utf-8"?>
 <ct:contentTypeSchema xmlns:ct="http://schemas.microsoft.com/office/2006/metadata/contentType" xmlns:ma="http://schemas.microsoft.com/office/2006/metadata/properties/metaAttributes" ct:_="" ma:_="" ma:contentTypeName="Documento" ma:contentTypeID="0x0101007B2BC552F8935D439DA4C97B8EDF327E" ma:contentTypeVersion="6" ma:contentTypeDescription="Crear nuevo documento." ma:contentTypeScope="" ma:versionID="95b740eadd4cf3079cb70c68d805db7d">
   <xsd:schema xmlns:xsd="http://www.w3.org/2001/XMLSchema" xmlns:xs="http://www.w3.org/2001/XMLSchema" xmlns:p="http://schemas.microsoft.com/office/2006/metadata/properties" xmlns:ns3="7a2fa7b8-237b-4936-8d0e-f4f61d3514b7" targetNamespace="http://schemas.microsoft.com/office/2006/metadata/properties" ma:root="true" ma:fieldsID="a22367eb10b7191be46c797c78a70cf3" ns3:_="">
     <xsd:import namespace="7a2fa7b8-237b-4936-8d0e-f4f61d3514b7"/>
@@ -32833,15 +32842,6 @@
 </ct:contentTypeSchema>
 </file>
 
-<file path=customXml/item2.xml><?xml version="1.0" encoding="utf-8"?>
-<?mso-contentType ?>
-<FormTemplates xmlns="http://schemas.microsoft.com/sharepoint/v3/contenttype/forms">
-  <Display>DocumentLibraryForm</Display>
-  <Edit>DocumentLibraryForm</Edit>
-  <New>DocumentLibraryForm</New>
-</FormTemplates>
-</file>
-
 <file path=customXml/item3.xml><?xml version="1.0" encoding="utf-8"?>
 <p:properties xmlns:p="http://schemas.microsoft.com/office/2006/metadata/properties" xmlns:xsi="http://www.w3.org/2001/XMLSchema-instance" xmlns:pc="http://schemas.microsoft.com/office/infopath/2007/PartnerControls">
   <documentManagement>
@@ -32851,6 +32851,14 @@
 </file>
 
 <file path=customXml/itemProps1.xml><?xml version="1.0" encoding="utf-8"?>
+<ds:datastoreItem xmlns:ds="http://schemas.openxmlformats.org/officeDocument/2006/customXml" ds:itemID="{D5EADC3D-951F-4256-B5AC-93ABBABE267B}">
+  <ds:schemaRefs>
+    <ds:schemaRef ds:uri="http://schemas.microsoft.com/sharepoint/v3/contenttype/forms"/>
+  </ds:schemaRefs>
+</ds:datastoreItem>
+</file>
+
+<file path=customXml/itemProps2.xml><?xml version="1.0" encoding="utf-8"?>
 <ds:datastoreItem xmlns:ds="http://schemas.openxmlformats.org/officeDocument/2006/customXml" ds:itemID="{0E711DE7-A887-48A7-9897-5ABB20DD7607}">
   <ds:schemaRefs>
     <ds:schemaRef ds:uri="http://schemas.microsoft.com/office/2006/metadata/contentType"/>
@@ -32864,14 +32872,6 @@
     <ds:schemaRef ds:uri="http://purl.org/dc/elements/1.1/"/>
     <ds:schemaRef ds:uri="http://purl.org/dc/terms/"/>
     <ds:schemaRef ds:uri="http://schemas.microsoft.com/internal/obd"/>
-  </ds:schemaRefs>
-</ds:datastoreItem>
-</file>
-
-<file path=customXml/itemProps2.xml><?xml version="1.0" encoding="utf-8"?>
-<ds:datastoreItem xmlns:ds="http://schemas.openxmlformats.org/officeDocument/2006/customXml" ds:itemID="{D5EADC3D-951F-4256-B5AC-93ABBABE267B}">
-  <ds:schemaRefs>
-    <ds:schemaRef ds:uri="http://schemas.microsoft.com/sharepoint/v3/contenttype/forms"/>
   </ds:schemaRefs>
 </ds:datastoreItem>
 </file>

</xml_diff>